<commit_message>
presentación terminada, este último commit hecho por Óscar
</commit_message>
<xml_diff>
--- a/ENTREGAS/SEGUNDA ENTREGA/Presentación Segunda Entrega.pptx
+++ b/ENTREGAS/SEGUNDA ENTREGA/Presentación Segunda Entrega.pptx
@@ -672,6 +672,90 @@
     <p:extLst>
       <p:ext uri="{BB962C8B-B14F-4D97-AF65-F5344CB8AC3E}">
         <p14:creationId xmlns:p14="http://schemas.microsoft.com/office/powerpoint/2010/main" val="1651519183"/>
+      </p:ext>
+    </p:extLst>
+  </p:cSld>
+  <p:clrMapOvr>
+    <a:masterClrMapping/>
+  </p:clrMapOvr>
+</p:notes>
+</file>
+
+<file path=ppt/notesSlides/notesSlide3.xml><?xml version="1.0" encoding="utf-8"?>
+<p:notes xmlns:a="http://schemas.openxmlformats.org/drawingml/2006/main" xmlns:r="http://schemas.openxmlformats.org/officeDocument/2006/relationships" xmlns:p="http://schemas.openxmlformats.org/presentationml/2006/main">
+  <p:cSld>
+    <p:spTree>
+      <p:nvGrpSpPr>
+        <p:cNvPr id="1" name=""/>
+        <p:cNvGrpSpPr/>
+        <p:nvPr/>
+      </p:nvGrpSpPr>
+      <p:grpSpPr>
+        <a:xfrm>
+          <a:off x="0" y="0"/>
+          <a:ext cx="0" cy="0"/>
+          <a:chOff x="0" y="0"/>
+          <a:chExt cx="0" cy="0"/>
+        </a:xfrm>
+      </p:grpSpPr>
+      <p:sp>
+        <p:nvSpPr>
+          <p:cNvPr id="2" name="Marcador de imagen de diapositiva 1"/>
+          <p:cNvSpPr>
+            <a:spLocks noGrp="1" noRot="1" noChangeAspect="1"/>
+          </p:cNvSpPr>
+          <p:nvPr>
+            <p:ph type="sldImg"/>
+          </p:nvPr>
+        </p:nvSpPr>
+        <p:spPr/>
+      </p:sp>
+      <p:sp>
+        <p:nvSpPr>
+          <p:cNvPr id="3" name="Marcador de notas 2"/>
+          <p:cNvSpPr>
+            <a:spLocks noGrp="1"/>
+          </p:cNvSpPr>
+          <p:nvPr>
+            <p:ph type="body" idx="1"/>
+          </p:nvPr>
+        </p:nvSpPr>
+        <p:spPr/>
+        <p:txBody>
+          <a:bodyPr/>
+          <a:lstStyle/>
+          <a:p>
+            <a:endParaRPr lang="es-ES" dirty="0"/>
+          </a:p>
+        </p:txBody>
+      </p:sp>
+      <p:sp>
+        <p:nvSpPr>
+          <p:cNvPr id="4" name="Marcador de número de diapositiva 3"/>
+          <p:cNvSpPr>
+            <a:spLocks noGrp="1"/>
+          </p:cNvSpPr>
+          <p:nvPr>
+            <p:ph type="sldNum" sz="quarter" idx="5"/>
+          </p:nvPr>
+        </p:nvSpPr>
+        <p:spPr/>
+        <p:txBody>
+          <a:bodyPr/>
+          <a:lstStyle/>
+          <a:p>
+            <a:fld id="{5A3B9299-42ED-41D3-8D3F-15BDB4D29E24}" type="slidenum">
+              <a:rPr lang="es-ES" smtClean="0"/>
+              <a:t>4</a:t>
+            </a:fld>
+            <a:endParaRPr lang="es-ES"/>
+          </a:p>
+        </p:txBody>
+      </p:sp>
+    </p:spTree>
+    <p:extLst>
+      <p:ext uri="{BB962C8B-B14F-4D97-AF65-F5344CB8AC3E}">
+        <p14:creationId xmlns:p14="http://schemas.microsoft.com/office/powerpoint/2010/main" val="3464728769"/>
       </p:ext>
     </p:extLst>
   </p:cSld>
@@ -3730,6 +3814,13 @@
               <a:srgbClr val="5271FF"/>
             </a:solidFill>
           </p:spPr>
+          <p:txBody>
+            <a:bodyPr/>
+            <a:lstStyle/>
+            <a:p>
+              <a:endParaRPr lang="es-ES"/>
+            </a:p>
+          </p:txBody>
         </p:sp>
       </p:grpSp>
       <p:grpSp>
@@ -3804,6 +3895,13 @@
               <a:srgbClr val="FFFFFF"/>
             </a:solidFill>
           </p:spPr>
+          <p:txBody>
+            <a:bodyPr/>
+            <a:lstStyle/>
+            <a:p>
+              <a:endParaRPr lang="es-ES"/>
+            </a:p>
+          </p:txBody>
         </p:sp>
       </p:grpSp>
       <p:grpSp>
@@ -3878,6 +3976,13 @@
               <a:srgbClr val="2B4A9D"/>
             </a:solidFill>
           </p:spPr>
+          <p:txBody>
+            <a:bodyPr/>
+            <a:lstStyle/>
+            <a:p>
+              <a:endParaRPr lang="es-ES"/>
+            </a:p>
+          </p:txBody>
         </p:sp>
       </p:grpSp>
       <p:sp>
@@ -4061,6 +4166,13 @@
             </a:stretch>
           </a:blipFill>
         </p:spPr>
+        <p:txBody>
+          <a:bodyPr/>
+          <a:lstStyle/>
+          <a:p>
+            <a:endParaRPr lang="es-ES"/>
+          </a:p>
+        </p:txBody>
       </p:sp>
       <p:grpSp>
         <p:nvGrpSpPr>
@@ -4115,6 +4227,13 @@
               <a:srgbClr val="2B4A9D"/>
             </a:solidFill>
           </p:spPr>
+          <p:txBody>
+            <a:bodyPr/>
+            <a:lstStyle/>
+            <a:p>
+              <a:endParaRPr lang="es-ES"/>
+            </a:p>
+          </p:txBody>
         </p:sp>
       </p:grpSp>
       <p:sp>
@@ -4257,6 +4376,13 @@
               <a:srgbClr val="5271FF"/>
             </a:solidFill>
           </p:spPr>
+          <p:txBody>
+            <a:bodyPr/>
+            <a:lstStyle/>
+            <a:p>
+              <a:endParaRPr lang="es-ES"/>
+            </a:p>
+          </p:txBody>
         </p:sp>
       </p:grpSp>
       <p:grpSp>
@@ -4343,6 +4469,13 @@
               <a:srgbClr val="FFFFFF"/>
             </a:solidFill>
           </p:spPr>
+          <p:txBody>
+            <a:bodyPr/>
+            <a:lstStyle/>
+            <a:p>
+              <a:endParaRPr lang="es-ES"/>
+            </a:p>
+          </p:txBody>
         </p:sp>
       </p:grpSp>
       <p:grpSp>
@@ -4410,6 +4543,13 @@
               <a:srgbClr val="5271FF"/>
             </a:solidFill>
           </p:spPr>
+          <p:txBody>
+            <a:bodyPr/>
+            <a:lstStyle/>
+            <a:p>
+              <a:endParaRPr lang="es-ES"/>
+            </a:p>
+          </p:txBody>
         </p:sp>
       </p:grpSp>
       <p:grpSp>
@@ -4496,6 +4636,13 @@
               <a:srgbClr val="FFFFFF"/>
             </a:solidFill>
           </p:spPr>
+          <p:txBody>
+            <a:bodyPr/>
+            <a:lstStyle/>
+            <a:p>
+              <a:endParaRPr lang="es-ES"/>
+            </a:p>
+          </p:txBody>
         </p:sp>
       </p:grpSp>
       <p:grpSp>
@@ -4563,6 +4710,13 @@
               <a:srgbClr val="5271FF"/>
             </a:solidFill>
           </p:spPr>
+          <p:txBody>
+            <a:bodyPr/>
+            <a:lstStyle/>
+            <a:p>
+              <a:endParaRPr lang="es-ES"/>
+            </a:p>
+          </p:txBody>
         </p:sp>
       </p:grpSp>
       <p:grpSp>
@@ -4649,6 +4803,13 @@
               <a:srgbClr val="FFFFFF"/>
             </a:solidFill>
           </p:spPr>
+          <p:txBody>
+            <a:bodyPr/>
+            <a:lstStyle/>
+            <a:p>
+              <a:endParaRPr lang="es-ES"/>
+            </a:p>
+          </p:txBody>
         </p:sp>
       </p:grpSp>
       <p:sp>
@@ -4760,7 +4921,7 @@
         <p:spPr>
           <a:xfrm>
             <a:off x="4138612" y="2095500"/>
-            <a:ext cx="13692188" cy="3416320"/>
+            <a:ext cx="13692188" cy="10064294"/>
           </a:xfrm>
           <a:prstGeom prst="rect">
             <a:avLst/>
@@ -4780,6 +4941,77 @@
                 <a:cs typeface="Lato Italics" panose="020B0604020202020204" charset="0"/>
               </a:rPr>
               <a:t>Creación de nuevas variables:</a:t>
+            </a:r>
+          </a:p>
+          <a:p>
+            <a:endParaRPr lang="es-ES" sz="3600" dirty="0">
+              <a:latin typeface="Lato Italics" panose="020B0604020202020204" charset="0"/>
+              <a:ea typeface="Lato Italics" panose="020B0604020202020204" charset="0"/>
+              <a:cs typeface="Lato Italics" panose="020B0604020202020204" charset="0"/>
+            </a:endParaRPr>
+          </a:p>
+          <a:p>
+            <a:r>
+              <a:rPr lang="es-ES" sz="3600" dirty="0">
+                <a:latin typeface="Lato Italics" panose="020B0604020202020204" charset="0"/>
+                <a:ea typeface="Lato Italics" panose="020B0604020202020204" charset="0"/>
+                <a:cs typeface="Lato Italics" panose="020B0604020202020204" charset="0"/>
+              </a:rPr>
+              <a:t>Separación de apps en titularidades y suplencias.</a:t>
+            </a:r>
+          </a:p>
+          <a:p>
+            <a:endParaRPr lang="es-ES" sz="3600" dirty="0">
+              <a:latin typeface="Lato Italics" panose="020B0604020202020204" charset="0"/>
+              <a:ea typeface="Lato Italics" panose="020B0604020202020204" charset="0"/>
+              <a:cs typeface="Lato Italics" panose="020B0604020202020204" charset="0"/>
+            </a:endParaRPr>
+          </a:p>
+          <a:p>
+            <a:r>
+              <a:rPr lang="es-ES" sz="3600" dirty="0">
+                <a:latin typeface="Lato Italics" panose="020B0604020202020204" charset="0"/>
+                <a:ea typeface="Lato Italics" panose="020B0604020202020204" charset="0"/>
+                <a:cs typeface="Lato Italics" panose="020B0604020202020204" charset="0"/>
+              </a:rPr>
+              <a:t>Variables adicionales: Variables específicas que benefician más a unos jugadores que a otros. </a:t>
+            </a:r>
+          </a:p>
+          <a:p>
+            <a:r>
+              <a:rPr lang="es-ES" sz="3600" dirty="0">
+                <a:latin typeface="Lato Italics" panose="020B0604020202020204" charset="0"/>
+                <a:ea typeface="Lato Italics" panose="020B0604020202020204" charset="0"/>
+                <a:cs typeface="Lato Italics" panose="020B0604020202020204" charset="0"/>
+              </a:rPr>
+              <a:t>Tasas y estadísticas específicas como distancia desde la que se marcan los goles, con qué parte del cuerpo, etc.</a:t>
+            </a:r>
+          </a:p>
+          <a:p>
+            <a:r>
+              <a:rPr lang="es-ES" sz="3600" dirty="0">
+                <a:latin typeface="Lato Italics" panose="020B0604020202020204" charset="0"/>
+                <a:ea typeface="Lato Italics" panose="020B0604020202020204" charset="0"/>
+                <a:cs typeface="Lato Italics" panose="020B0604020202020204" charset="0"/>
+              </a:rPr>
+              <a:t>No presentes: No son útiles para muchos jugadores, no son fáciles de agregar a las demás por diferencias y redundancias.</a:t>
+            </a:r>
+          </a:p>
+          <a:p>
+            <a:endParaRPr lang="es-ES" sz="3600" dirty="0">
+              <a:latin typeface="Lato Italics" panose="020B0604020202020204" charset="0"/>
+              <a:ea typeface="Lato Italics" panose="020B0604020202020204" charset="0"/>
+              <a:cs typeface="Lato Italics" panose="020B0604020202020204" charset="0"/>
+            </a:endParaRPr>
+          </a:p>
+          <a:p>
+            <a:r>
+              <a:rPr lang="es-ES" sz="3600" dirty="0">
+                <a:latin typeface="Lato Italics" panose="020B0604020202020204" charset="0"/>
+                <a:ea typeface="Lato Italics" panose="020B0604020202020204" charset="0"/>
+                <a:cs typeface="Lato Italics" panose="020B0604020202020204" charset="0"/>
+              </a:rPr>
+              <a:t>En caso de ser necesarias para la modelización, serán agregadas las más importantes</a:t>
             </a:r>
           </a:p>
           <a:p>
@@ -4898,6 +5130,13 @@
               <a:srgbClr val="2B4A9D"/>
             </a:solidFill>
           </p:spPr>
+          <p:txBody>
+            <a:bodyPr/>
+            <a:lstStyle/>
+            <a:p>
+              <a:endParaRPr lang="es-ES"/>
+            </a:p>
+          </p:txBody>
         </p:sp>
       </p:grpSp>
       <p:grpSp>
@@ -4953,6 +5192,13 @@
               <a:srgbClr val="5271FF"/>
             </a:solidFill>
           </p:spPr>
+          <p:txBody>
+            <a:bodyPr/>
+            <a:lstStyle/>
+            <a:p>
+              <a:endParaRPr lang="es-ES"/>
+            </a:p>
+          </p:txBody>
         </p:sp>
       </p:grpSp>
       <p:grpSp>
@@ -5027,6 +5273,13 @@
               <a:srgbClr val="FFFFFF"/>
             </a:solidFill>
           </p:spPr>
+          <p:txBody>
+            <a:bodyPr/>
+            <a:lstStyle/>
+            <a:p>
+              <a:endParaRPr lang="es-ES"/>
+            </a:p>
+          </p:txBody>
         </p:sp>
       </p:grpSp>
       <p:grpSp>
@@ -5082,6 +5335,13 @@
               <a:srgbClr val="5271FF"/>
             </a:solidFill>
           </p:spPr>
+          <p:txBody>
+            <a:bodyPr/>
+            <a:lstStyle/>
+            <a:p>
+              <a:endParaRPr lang="es-ES"/>
+            </a:p>
+          </p:txBody>
         </p:sp>
       </p:grpSp>
       <p:grpSp>
@@ -5156,6 +5416,13 @@
               <a:srgbClr val="FFFFFF"/>
             </a:solidFill>
           </p:spPr>
+          <p:txBody>
+            <a:bodyPr/>
+            <a:lstStyle/>
+            <a:p>
+              <a:endParaRPr lang="es-ES"/>
+            </a:p>
+          </p:txBody>
         </p:sp>
       </p:grpSp>
       <p:grpSp>
@@ -5211,6 +5478,13 @@
               <a:srgbClr val="5271FF"/>
             </a:solidFill>
           </p:spPr>
+          <p:txBody>
+            <a:bodyPr/>
+            <a:lstStyle/>
+            <a:p>
+              <a:endParaRPr lang="es-ES"/>
+            </a:p>
+          </p:txBody>
         </p:sp>
       </p:grpSp>
       <p:grpSp>
@@ -5285,6 +5559,13 @@
               <a:srgbClr val="FFFFFF"/>
             </a:solidFill>
           </p:spPr>
+          <p:txBody>
+            <a:bodyPr/>
+            <a:lstStyle/>
+            <a:p>
+              <a:endParaRPr lang="es-ES"/>
+            </a:p>
+          </p:txBody>
         </p:sp>
       </p:grpSp>
       <p:sp>
@@ -5494,6 +5775,13 @@
               <a:srgbClr val="2B4A9D"/>
             </a:solidFill>
           </p:spPr>
+          <p:txBody>
+            <a:bodyPr/>
+            <a:lstStyle/>
+            <a:p>
+              <a:endParaRPr lang="es-ES"/>
+            </a:p>
+          </p:txBody>
         </p:sp>
       </p:grpSp>
       <p:sp>
@@ -5591,6 +5879,13 @@
             </a:stretch>
           </a:blipFill>
         </p:spPr>
+        <p:txBody>
+          <a:bodyPr/>
+          <a:lstStyle/>
+          <a:p>
+            <a:endParaRPr lang="es-ES"/>
+          </a:p>
+        </p:txBody>
       </p:sp>
     </p:spTree>
   </p:cSld>
@@ -5688,6 +5983,13 @@
               <a:srgbClr val="5271FF"/>
             </a:solidFill>
           </p:spPr>
+          <p:txBody>
+            <a:bodyPr/>
+            <a:lstStyle/>
+            <a:p>
+              <a:endParaRPr lang="es-ES"/>
+            </a:p>
+          </p:txBody>
         </p:sp>
       </p:grpSp>
       <p:grpSp>
@@ -5774,6 +6076,13 @@
               <a:srgbClr val="FFFFFF"/>
             </a:solidFill>
           </p:spPr>
+          <p:txBody>
+            <a:bodyPr/>
+            <a:lstStyle/>
+            <a:p>
+              <a:endParaRPr lang="es-ES"/>
+            </a:p>
+          </p:txBody>
         </p:sp>
       </p:grpSp>
       <p:grpSp>
@@ -5841,6 +6150,13 @@
               <a:srgbClr val="5271FF"/>
             </a:solidFill>
           </p:spPr>
+          <p:txBody>
+            <a:bodyPr/>
+            <a:lstStyle/>
+            <a:p>
+              <a:endParaRPr lang="es-ES"/>
+            </a:p>
+          </p:txBody>
         </p:sp>
       </p:grpSp>
       <p:grpSp>
@@ -5927,6 +6243,13 @@
               <a:srgbClr val="FFFFFF"/>
             </a:solidFill>
           </p:spPr>
+          <p:txBody>
+            <a:bodyPr/>
+            <a:lstStyle/>
+            <a:p>
+              <a:endParaRPr lang="es-ES"/>
+            </a:p>
+          </p:txBody>
         </p:sp>
       </p:grpSp>
       <p:grpSp>
@@ -5994,6 +6317,13 @@
               <a:srgbClr val="5271FF"/>
             </a:solidFill>
           </p:spPr>
+          <p:txBody>
+            <a:bodyPr/>
+            <a:lstStyle/>
+            <a:p>
+              <a:endParaRPr lang="es-ES"/>
+            </a:p>
+          </p:txBody>
         </p:sp>
       </p:grpSp>
       <p:grpSp>
@@ -6080,6 +6410,13 @@
               <a:srgbClr val="FFFFFF"/>
             </a:solidFill>
           </p:spPr>
+          <p:txBody>
+            <a:bodyPr/>
+            <a:lstStyle/>
+            <a:p>
+              <a:endParaRPr lang="es-ES"/>
+            </a:p>
+          </p:txBody>
         </p:sp>
       </p:grpSp>
       <p:sp>
@@ -6146,69 +6483,497 @@
         </p:nvSpPr>
         <p:spPr>
           <a:xfrm>
-            <a:off x="3997858" y="2523496"/>
-            <a:ext cx="2528376" cy="1190592"/>
+            <a:off x="4572000" y="1876482"/>
+            <a:ext cx="11734800" cy="7369582"/>
           </a:xfrm>
           <a:prstGeom prst="rect">
             <a:avLst/>
           </a:prstGeom>
         </p:spPr>
         <p:txBody>
-          <a:bodyPr lIns="0" tIns="0" rIns="0" bIns="0" rtlCol="0" anchor="t">
+          <a:bodyPr wrap="square" lIns="0" tIns="0" rIns="0" bIns="0" rtlCol="0" anchor="t">
             <a:spAutoFit/>
           </a:bodyPr>
           <a:lstStyle/>
           <a:p>
-            <a:pPr algn="ctr">
+            <a:pPr>
               <a:lnSpc>
                 <a:spcPts val="8400"/>
               </a:lnSpc>
             </a:pPr>
             <a:r>
-              <a:rPr lang="en-US" sz="8000" spc="400">
-                <a:solidFill>
-                  <a:srgbClr val="FFFFFF"/>
-                </a:solidFill>
-                <a:latin typeface="Poppins Heavy"/>
-              </a:rPr>
-              <a:t>1</a:t>
-            </a:r>
-          </a:p>
-        </p:txBody>
-      </p:sp>
-      <p:sp>
-        <p:nvSpPr>
-          <p:cNvPr id="3" name="CuadroTexto 2">
-            <a:extLst>
-              <a:ext uri="{FF2B5EF4-FFF2-40B4-BE49-F238E27FC236}">
-                <a16:creationId xmlns:a16="http://schemas.microsoft.com/office/drawing/2014/main" id="{9C4973BD-E77A-AA47-CE48-296575ED9649}"/>
-              </a:ext>
-            </a:extLst>
-          </p:cNvPr>
-          <p:cNvSpPr txBox="1"/>
-          <p:nvPr/>
-        </p:nvSpPr>
-        <p:spPr>
-          <a:xfrm>
-            <a:off x="4495800" y="2247900"/>
-            <a:ext cx="13106400" cy="369332"/>
-          </a:xfrm>
-          <a:prstGeom prst="rect">
-            <a:avLst/>
-          </a:prstGeom>
-          <a:noFill/>
-        </p:spPr>
-        <p:txBody>
-          <a:bodyPr wrap="square" rtlCol="0">
-            <a:spAutoFit/>
-          </a:bodyPr>
-          <a:lstStyle/>
-          <a:p>
-            <a:r>
-              <a:rPr lang="es-ES" dirty="0" err="1"/>
-              <a:t>vsd</a:t>
-            </a:r>
-            <a:endParaRPr lang="es-ES" dirty="0"/>
+              <a:rPr lang="en-US" sz="3600" dirty="0" err="1">
+                <a:latin typeface="Lato Italics" panose="020B0604020202020204" charset="0"/>
+                <a:ea typeface="Lato Italics" panose="020B0604020202020204" charset="0"/>
+                <a:cs typeface="Lato Italics" panose="020B0604020202020204" charset="0"/>
+              </a:rPr>
+              <a:t>Datos</a:t>
+            </a:r>
+            <a:r>
+              <a:rPr lang="en-US" sz="3600" dirty="0">
+                <a:latin typeface="Lato Italics" panose="020B0604020202020204" charset="0"/>
+                <a:ea typeface="Lato Italics" panose="020B0604020202020204" charset="0"/>
+                <a:cs typeface="Lato Italics" panose="020B0604020202020204" charset="0"/>
+              </a:rPr>
+              <a:t> </a:t>
+            </a:r>
+            <a:r>
+              <a:rPr lang="en-US" sz="3600" dirty="0" err="1">
+                <a:latin typeface="Lato Italics" panose="020B0604020202020204" charset="0"/>
+                <a:ea typeface="Lato Italics" panose="020B0604020202020204" charset="0"/>
+                <a:cs typeface="Lato Italics" panose="020B0604020202020204" charset="0"/>
+              </a:rPr>
+              <a:t>juntos</a:t>
+            </a:r>
+            <a:r>
+              <a:rPr lang="en-US" sz="3600" dirty="0">
+                <a:latin typeface="Lato Italics" panose="020B0604020202020204" charset="0"/>
+                <a:ea typeface="Lato Italics" panose="020B0604020202020204" charset="0"/>
+                <a:cs typeface="Lato Italics" panose="020B0604020202020204" charset="0"/>
+              </a:rPr>
+              <a:t> para </a:t>
+            </a:r>
+            <a:r>
+              <a:rPr lang="en-US" sz="3600" dirty="0" err="1">
+                <a:latin typeface="Lato Italics" panose="020B0604020202020204" charset="0"/>
+                <a:ea typeface="Lato Italics" panose="020B0604020202020204" charset="0"/>
+                <a:cs typeface="Lato Italics" panose="020B0604020202020204" charset="0"/>
+              </a:rPr>
+              <a:t>hacer</a:t>
+            </a:r>
+            <a:r>
+              <a:rPr lang="en-US" sz="3600" dirty="0">
+                <a:latin typeface="Lato Italics" panose="020B0604020202020204" charset="0"/>
+                <a:ea typeface="Lato Italics" panose="020B0604020202020204" charset="0"/>
+                <a:cs typeface="Lato Italics" panose="020B0604020202020204" charset="0"/>
+              </a:rPr>
+              <a:t> un </a:t>
+            </a:r>
+            <a:r>
+              <a:rPr lang="en-US" sz="3600" dirty="0" err="1">
+                <a:latin typeface="Lato Italics" panose="020B0604020202020204" charset="0"/>
+                <a:ea typeface="Lato Italics" panose="020B0604020202020204" charset="0"/>
+                <a:cs typeface="Lato Italics" panose="020B0604020202020204" charset="0"/>
+              </a:rPr>
+              <a:t>modelo</a:t>
+            </a:r>
+            <a:endParaRPr lang="en-US" sz="3600" dirty="0">
+              <a:latin typeface="Lato Italics" panose="020B0604020202020204" charset="0"/>
+              <a:ea typeface="Lato Italics" panose="020B0604020202020204" charset="0"/>
+              <a:cs typeface="Lato Italics" panose="020B0604020202020204" charset="0"/>
+            </a:endParaRPr>
+          </a:p>
+          <a:p>
+            <a:pPr>
+              <a:lnSpc>
+                <a:spcPts val="8400"/>
+              </a:lnSpc>
+            </a:pPr>
+            <a:r>
+              <a:rPr lang="en-US" sz="3600" dirty="0" err="1">
+                <a:latin typeface="Lato Italics" panose="020B0604020202020204" charset="0"/>
+                <a:ea typeface="Lato Italics" panose="020B0604020202020204" charset="0"/>
+                <a:cs typeface="Lato Italics" panose="020B0604020202020204" charset="0"/>
+              </a:rPr>
+              <a:t>Problema</a:t>
+            </a:r>
+            <a:r>
+              <a:rPr lang="en-US" sz="3600" dirty="0">
+                <a:latin typeface="Lato Italics" panose="020B0604020202020204" charset="0"/>
+                <a:ea typeface="Lato Italics" panose="020B0604020202020204" charset="0"/>
+                <a:cs typeface="Lato Italics" panose="020B0604020202020204" charset="0"/>
+              </a:rPr>
+              <a:t> de </a:t>
+            </a:r>
+            <a:r>
+              <a:rPr lang="en-US" sz="3600" dirty="0" err="1">
+                <a:latin typeface="Lato Italics" panose="020B0604020202020204" charset="0"/>
+                <a:ea typeface="Lato Italics" panose="020B0604020202020204" charset="0"/>
+                <a:cs typeface="Lato Italics" panose="020B0604020202020204" charset="0"/>
+              </a:rPr>
+              <a:t>hacer</a:t>
+            </a:r>
+            <a:r>
+              <a:rPr lang="en-US" sz="3600" dirty="0">
+                <a:latin typeface="Lato Italics" panose="020B0604020202020204" charset="0"/>
+                <a:ea typeface="Lato Italics" panose="020B0604020202020204" charset="0"/>
+                <a:cs typeface="Lato Italics" panose="020B0604020202020204" charset="0"/>
+              </a:rPr>
+              <a:t> multiples </a:t>
+            </a:r>
+            <a:r>
+              <a:rPr lang="en-US" sz="3600" dirty="0" err="1">
+                <a:latin typeface="Lato Italics" panose="020B0604020202020204" charset="0"/>
+                <a:ea typeface="Lato Italics" panose="020B0604020202020204" charset="0"/>
+                <a:cs typeface="Lato Italics" panose="020B0604020202020204" charset="0"/>
+              </a:rPr>
+              <a:t>modelos</a:t>
+            </a:r>
+            <a:r>
+              <a:rPr lang="en-US" sz="3600" dirty="0">
+                <a:latin typeface="Lato Italics" panose="020B0604020202020204" charset="0"/>
+                <a:ea typeface="Lato Italics" panose="020B0604020202020204" charset="0"/>
+                <a:cs typeface="Lato Italics" panose="020B0604020202020204" charset="0"/>
+              </a:rPr>
+              <a:t>: </a:t>
+            </a:r>
+          </a:p>
+          <a:p>
+            <a:pPr>
+              <a:lnSpc>
+                <a:spcPts val="8400"/>
+              </a:lnSpc>
+            </a:pPr>
+            <a:r>
+              <a:rPr lang="en-US" sz="3600" dirty="0">
+                <a:latin typeface="Lato Italics" panose="020B0604020202020204" charset="0"/>
+                <a:ea typeface="Lato Italics" panose="020B0604020202020204" charset="0"/>
+                <a:cs typeface="Lato Italics" panose="020B0604020202020204" charset="0"/>
+              </a:rPr>
+              <a:t>Falta de </a:t>
+            </a:r>
+            <a:r>
+              <a:rPr lang="en-US" sz="3600" dirty="0" err="1">
+                <a:latin typeface="Lato Italics" panose="020B0604020202020204" charset="0"/>
+                <a:ea typeface="Lato Italics" panose="020B0604020202020204" charset="0"/>
+                <a:cs typeface="Lato Italics" panose="020B0604020202020204" charset="0"/>
+              </a:rPr>
+              <a:t>columnas</a:t>
+            </a:r>
+            <a:r>
+              <a:rPr lang="en-US" sz="3600" dirty="0">
+                <a:latin typeface="Lato Italics" panose="020B0604020202020204" charset="0"/>
+                <a:ea typeface="Lato Italics" panose="020B0604020202020204" charset="0"/>
+                <a:cs typeface="Lato Italics" panose="020B0604020202020204" charset="0"/>
+              </a:rPr>
+              <a:t> </a:t>
+            </a:r>
+            <a:r>
+              <a:rPr lang="en-US" sz="3600" dirty="0" err="1">
+                <a:latin typeface="Lato Italics" panose="020B0604020202020204" charset="0"/>
+                <a:ea typeface="Lato Italics" panose="020B0604020202020204" charset="0"/>
+                <a:cs typeface="Lato Italics" panose="020B0604020202020204" charset="0"/>
+              </a:rPr>
+              <a:t>útiles</a:t>
+            </a:r>
+            <a:r>
+              <a:rPr lang="en-US" sz="3600" dirty="0">
+                <a:latin typeface="Lato Italics" panose="020B0604020202020204" charset="0"/>
+                <a:ea typeface="Lato Italics" panose="020B0604020202020204" charset="0"/>
+                <a:cs typeface="Lato Italics" panose="020B0604020202020204" charset="0"/>
+              </a:rPr>
+              <a:t> y de </a:t>
+            </a:r>
+            <a:r>
+              <a:rPr lang="en-US" sz="3600" dirty="0" err="1">
+                <a:latin typeface="Lato Italics" panose="020B0604020202020204" charset="0"/>
+                <a:ea typeface="Lato Italics" panose="020B0604020202020204" charset="0"/>
+                <a:cs typeface="Lato Italics" panose="020B0604020202020204" charset="0"/>
+              </a:rPr>
+              <a:t>jugadores</a:t>
+            </a:r>
+            <a:r>
+              <a:rPr lang="en-US" sz="3600" dirty="0">
+                <a:latin typeface="Lato Italics" panose="020B0604020202020204" charset="0"/>
+                <a:ea typeface="Lato Italics" panose="020B0604020202020204" charset="0"/>
+                <a:cs typeface="Lato Italics" panose="020B0604020202020204" charset="0"/>
+              </a:rPr>
+              <a:t> </a:t>
+            </a:r>
+            <a:r>
+              <a:rPr lang="en-US" sz="3600" dirty="0" err="1">
+                <a:latin typeface="Lato Italics" panose="020B0604020202020204" charset="0"/>
+                <a:ea typeface="Lato Italics" panose="020B0604020202020204" charset="0"/>
+                <a:cs typeface="Lato Italics" panose="020B0604020202020204" charset="0"/>
+              </a:rPr>
+              <a:t>aplicables</a:t>
+            </a:r>
+            <a:endParaRPr lang="en-US" sz="3600" dirty="0">
+              <a:latin typeface="Lato Italics" panose="020B0604020202020204" charset="0"/>
+              <a:ea typeface="Lato Italics" panose="020B0604020202020204" charset="0"/>
+              <a:cs typeface="Lato Italics" panose="020B0604020202020204" charset="0"/>
+            </a:endParaRPr>
+          </a:p>
+          <a:p>
+            <a:pPr>
+              <a:lnSpc>
+                <a:spcPts val="8400"/>
+              </a:lnSpc>
+            </a:pPr>
+            <a:r>
+              <a:rPr lang="en-US" sz="3600" dirty="0">
+                <a:latin typeface="Lato Italics" panose="020B0604020202020204" charset="0"/>
+                <a:ea typeface="Lato Italics" panose="020B0604020202020204" charset="0"/>
+                <a:cs typeface="Lato Italics" panose="020B0604020202020204" charset="0"/>
+              </a:rPr>
+              <a:t>En </a:t>
+            </a:r>
+            <a:r>
+              <a:rPr lang="en-US" sz="3600" dirty="0" err="1">
+                <a:latin typeface="Lato Italics" panose="020B0604020202020204" charset="0"/>
+                <a:ea typeface="Lato Italics" panose="020B0604020202020204" charset="0"/>
+                <a:cs typeface="Lato Italics" panose="020B0604020202020204" charset="0"/>
+              </a:rPr>
+              <a:t>caso</a:t>
+            </a:r>
+            <a:r>
+              <a:rPr lang="en-US" sz="3600" dirty="0">
+                <a:latin typeface="Lato Italics" panose="020B0604020202020204" charset="0"/>
+                <a:ea typeface="Lato Italics" panose="020B0604020202020204" charset="0"/>
+                <a:cs typeface="Lato Italics" panose="020B0604020202020204" charset="0"/>
+              </a:rPr>
+              <a:t> de no </a:t>
+            </a:r>
+            <a:r>
+              <a:rPr lang="en-US" sz="3600" dirty="0" err="1">
+                <a:latin typeface="Lato Italics" panose="020B0604020202020204" charset="0"/>
+                <a:ea typeface="Lato Italics" panose="020B0604020202020204" charset="0"/>
+                <a:cs typeface="Lato Italics" panose="020B0604020202020204" charset="0"/>
+              </a:rPr>
+              <a:t>poder</a:t>
+            </a:r>
+            <a:r>
+              <a:rPr lang="en-US" sz="3600" dirty="0">
+                <a:latin typeface="Lato Italics" panose="020B0604020202020204" charset="0"/>
+                <a:ea typeface="Lato Italics" panose="020B0604020202020204" charset="0"/>
+                <a:cs typeface="Lato Italics" panose="020B0604020202020204" charset="0"/>
+              </a:rPr>
+              <a:t> </a:t>
+            </a:r>
+            <a:r>
+              <a:rPr lang="en-US" sz="3600" dirty="0" err="1">
+                <a:latin typeface="Lato Italics" panose="020B0604020202020204" charset="0"/>
+                <a:ea typeface="Lato Italics" panose="020B0604020202020204" charset="0"/>
+                <a:cs typeface="Lato Italics" panose="020B0604020202020204" charset="0"/>
+              </a:rPr>
+              <a:t>aplicar</a:t>
+            </a:r>
+            <a:r>
+              <a:rPr lang="en-US" sz="3600" dirty="0">
+                <a:latin typeface="Lato Italics" panose="020B0604020202020204" charset="0"/>
+                <a:ea typeface="Lato Italics" panose="020B0604020202020204" charset="0"/>
+                <a:cs typeface="Lato Italics" panose="020B0604020202020204" charset="0"/>
+              </a:rPr>
+              <a:t> un </a:t>
+            </a:r>
+            <a:r>
+              <a:rPr lang="en-US" sz="3600" dirty="0" err="1">
+                <a:latin typeface="Lato Italics" panose="020B0604020202020204" charset="0"/>
+                <a:ea typeface="Lato Italics" panose="020B0604020202020204" charset="0"/>
+                <a:cs typeface="Lato Italics" panose="020B0604020202020204" charset="0"/>
+              </a:rPr>
+              <a:t>único</a:t>
+            </a:r>
+            <a:r>
+              <a:rPr lang="en-US" sz="3600" dirty="0">
+                <a:latin typeface="Lato Italics" panose="020B0604020202020204" charset="0"/>
+                <a:ea typeface="Lato Italics" panose="020B0604020202020204" charset="0"/>
+                <a:cs typeface="Lato Italics" panose="020B0604020202020204" charset="0"/>
+              </a:rPr>
+              <a:t> </a:t>
+            </a:r>
+            <a:r>
+              <a:rPr lang="en-US" sz="3600" dirty="0" err="1">
+                <a:latin typeface="Lato Italics" panose="020B0604020202020204" charset="0"/>
+                <a:ea typeface="Lato Italics" panose="020B0604020202020204" charset="0"/>
+                <a:cs typeface="Lato Italics" panose="020B0604020202020204" charset="0"/>
+              </a:rPr>
+              <a:t>modelo</a:t>
+            </a:r>
+            <a:r>
+              <a:rPr lang="en-US" sz="3600" dirty="0">
+                <a:latin typeface="Lato Italics" panose="020B0604020202020204" charset="0"/>
+                <a:ea typeface="Lato Italics" panose="020B0604020202020204" charset="0"/>
+                <a:cs typeface="Lato Italics" panose="020B0604020202020204" charset="0"/>
+              </a:rPr>
+              <a:t>:</a:t>
+            </a:r>
+            <a:br>
+              <a:rPr lang="en-US" sz="3600" dirty="0">
+                <a:latin typeface="Lato Italics" panose="020B0604020202020204" charset="0"/>
+                <a:ea typeface="Lato Italics" panose="020B0604020202020204" charset="0"/>
+                <a:cs typeface="Lato Italics" panose="020B0604020202020204" charset="0"/>
+              </a:rPr>
+            </a:br>
+            <a:r>
+              <a:rPr lang="en-US" sz="3600" dirty="0">
+                <a:latin typeface="Lato Italics" panose="020B0604020202020204" charset="0"/>
+                <a:ea typeface="Lato Italics" panose="020B0604020202020204" charset="0"/>
+                <a:cs typeface="Lato Italics" panose="020B0604020202020204" charset="0"/>
+              </a:rPr>
+              <a:t>-</a:t>
+            </a:r>
+            <a:r>
+              <a:rPr lang="en-US" sz="3600" dirty="0" err="1">
+                <a:latin typeface="Lato Italics" panose="020B0604020202020204" charset="0"/>
+                <a:ea typeface="Lato Italics" panose="020B0604020202020204" charset="0"/>
+                <a:cs typeface="Lato Italics" panose="020B0604020202020204" charset="0"/>
+              </a:rPr>
+              <a:t>Comprobación</a:t>
+            </a:r>
+            <a:r>
+              <a:rPr lang="en-US" sz="3600" dirty="0">
+                <a:latin typeface="Lato Italics" panose="020B0604020202020204" charset="0"/>
+                <a:ea typeface="Lato Italics" panose="020B0604020202020204" charset="0"/>
+                <a:cs typeface="Lato Italics" panose="020B0604020202020204" charset="0"/>
+              </a:rPr>
+              <a:t> de </a:t>
+            </a:r>
+            <a:r>
+              <a:rPr lang="en-US" sz="3600" dirty="0" err="1">
+                <a:latin typeface="Lato Italics" panose="020B0604020202020204" charset="0"/>
+                <a:ea typeface="Lato Italics" panose="020B0604020202020204" charset="0"/>
+                <a:cs typeface="Lato Italics" panose="020B0604020202020204" charset="0"/>
+              </a:rPr>
+              <a:t>eficacia</a:t>
+            </a:r>
+            <a:r>
+              <a:rPr lang="en-US" sz="3600" dirty="0">
+                <a:latin typeface="Lato Italics" panose="020B0604020202020204" charset="0"/>
+                <a:ea typeface="Lato Italics" panose="020B0604020202020204" charset="0"/>
+                <a:cs typeface="Lato Italics" panose="020B0604020202020204" charset="0"/>
+              </a:rPr>
+              <a:t> </a:t>
+            </a:r>
+            <a:r>
+              <a:rPr lang="en-US" sz="3600" dirty="0" err="1">
+                <a:latin typeface="Lato Italics" panose="020B0604020202020204" charset="0"/>
+                <a:ea typeface="Lato Italics" panose="020B0604020202020204" charset="0"/>
+                <a:cs typeface="Lato Italics" panose="020B0604020202020204" charset="0"/>
+              </a:rPr>
+              <a:t>según</a:t>
+            </a:r>
+            <a:r>
+              <a:rPr lang="en-US" sz="3600" dirty="0">
+                <a:latin typeface="Lato Italics" panose="020B0604020202020204" charset="0"/>
+                <a:ea typeface="Lato Italics" panose="020B0604020202020204" charset="0"/>
+                <a:cs typeface="Lato Italics" panose="020B0604020202020204" charset="0"/>
+              </a:rPr>
+              <a:t> </a:t>
+            </a:r>
+            <a:r>
+              <a:rPr lang="en-US" sz="3600" dirty="0" err="1">
+                <a:latin typeface="Lato Italics" panose="020B0604020202020204" charset="0"/>
+                <a:ea typeface="Lato Italics" panose="020B0604020202020204" charset="0"/>
+                <a:cs typeface="Lato Italics" panose="020B0604020202020204" charset="0"/>
+              </a:rPr>
+              <a:t>el</a:t>
+            </a:r>
+            <a:r>
+              <a:rPr lang="en-US" sz="3600" dirty="0">
+                <a:latin typeface="Lato Italics" panose="020B0604020202020204" charset="0"/>
+                <a:ea typeface="Lato Italics" panose="020B0604020202020204" charset="0"/>
+                <a:cs typeface="Lato Italics" panose="020B0604020202020204" charset="0"/>
+              </a:rPr>
+              <a:t> </a:t>
+            </a:r>
+            <a:r>
+              <a:rPr lang="en-US" sz="3600" dirty="0" err="1">
+                <a:latin typeface="Lato Italics" panose="020B0604020202020204" charset="0"/>
+                <a:ea typeface="Lato Italics" panose="020B0604020202020204" charset="0"/>
+                <a:cs typeface="Lato Italics" panose="020B0604020202020204" charset="0"/>
+              </a:rPr>
+              <a:t>número</a:t>
+            </a:r>
+            <a:r>
+              <a:rPr lang="en-US" sz="3600" dirty="0">
+                <a:latin typeface="Lato Italics" panose="020B0604020202020204" charset="0"/>
+                <a:ea typeface="Lato Italics" panose="020B0604020202020204" charset="0"/>
+                <a:cs typeface="Lato Italics" panose="020B0604020202020204" charset="0"/>
+              </a:rPr>
+              <a:t> de </a:t>
+            </a:r>
+            <a:r>
+              <a:rPr lang="en-US" sz="3600" dirty="0" err="1">
+                <a:latin typeface="Lato Italics" panose="020B0604020202020204" charset="0"/>
+                <a:ea typeface="Lato Italics" panose="020B0604020202020204" charset="0"/>
+                <a:cs typeface="Lato Italics" panose="020B0604020202020204" charset="0"/>
+              </a:rPr>
+              <a:t>modelos</a:t>
+            </a:r>
+            <a:endParaRPr lang="en-US" sz="3600" dirty="0">
+              <a:latin typeface="Lato Italics" panose="020B0604020202020204" charset="0"/>
+              <a:ea typeface="Lato Italics" panose="020B0604020202020204" charset="0"/>
+              <a:cs typeface="Lato Italics" panose="020B0604020202020204" charset="0"/>
+            </a:endParaRPr>
+          </a:p>
+          <a:p>
+            <a:pPr>
+              <a:lnSpc>
+                <a:spcPts val="8400"/>
+              </a:lnSpc>
+            </a:pPr>
+            <a:r>
+              <a:rPr lang="en-US" sz="3600" dirty="0">
+                <a:latin typeface="Lato Italics" panose="020B0604020202020204" charset="0"/>
+                <a:ea typeface="Lato Italics" panose="020B0604020202020204" charset="0"/>
+                <a:cs typeface="Lato Italics" panose="020B0604020202020204" charset="0"/>
+              </a:rPr>
+              <a:t>-</a:t>
+            </a:r>
+            <a:r>
+              <a:rPr lang="en-US" sz="3600" dirty="0" err="1">
+                <a:latin typeface="Lato Italics" panose="020B0604020202020204" charset="0"/>
+                <a:ea typeface="Lato Italics" panose="020B0604020202020204" charset="0"/>
+                <a:cs typeface="Lato Italics" panose="020B0604020202020204" charset="0"/>
+              </a:rPr>
+              <a:t>Nuevas</a:t>
+            </a:r>
+            <a:r>
+              <a:rPr lang="en-US" sz="3600" dirty="0">
+                <a:latin typeface="Lato Italics" panose="020B0604020202020204" charset="0"/>
+                <a:ea typeface="Lato Italics" panose="020B0604020202020204" charset="0"/>
+                <a:cs typeface="Lato Italics" panose="020B0604020202020204" charset="0"/>
+              </a:rPr>
+              <a:t> variables: Variables </a:t>
+            </a:r>
+            <a:r>
+              <a:rPr lang="en-US" sz="3600" dirty="0" err="1">
+                <a:latin typeface="Lato Italics" panose="020B0604020202020204" charset="0"/>
+                <a:ea typeface="Lato Italics" panose="020B0604020202020204" charset="0"/>
+                <a:cs typeface="Lato Italics" panose="020B0604020202020204" charset="0"/>
+              </a:rPr>
+              <a:t>específicas</a:t>
+            </a:r>
+            <a:r>
+              <a:rPr lang="en-US" sz="3600" dirty="0">
+                <a:latin typeface="Lato Italics" panose="020B0604020202020204" charset="0"/>
+                <a:ea typeface="Lato Italics" panose="020B0604020202020204" charset="0"/>
+                <a:cs typeface="Lato Italics" panose="020B0604020202020204" charset="0"/>
+              </a:rPr>
+              <a:t> </a:t>
+            </a:r>
+            <a:r>
+              <a:rPr lang="en-US" sz="3600" dirty="0" err="1">
+                <a:latin typeface="Lato Italics" panose="020B0604020202020204" charset="0"/>
+                <a:ea typeface="Lato Italics" panose="020B0604020202020204" charset="0"/>
+                <a:cs typeface="Lato Italics" panose="020B0604020202020204" charset="0"/>
+              </a:rPr>
+              <a:t>mencionadas</a:t>
+            </a:r>
+            <a:r>
+              <a:rPr lang="en-US" sz="3600" dirty="0">
+                <a:latin typeface="Lato Italics" panose="020B0604020202020204" charset="0"/>
+                <a:ea typeface="Lato Italics" panose="020B0604020202020204" charset="0"/>
+                <a:cs typeface="Lato Italics" panose="020B0604020202020204" charset="0"/>
+              </a:rPr>
+              <a:t> antes</a:t>
+            </a:r>
+          </a:p>
+          <a:p>
+            <a:pPr>
+              <a:lnSpc>
+                <a:spcPts val="8400"/>
+              </a:lnSpc>
+            </a:pPr>
+            <a:r>
+              <a:rPr lang="en-US" sz="3600" dirty="0">
+                <a:latin typeface="Lato Italics" panose="020B0604020202020204" charset="0"/>
+                <a:ea typeface="Lato Italics" panose="020B0604020202020204" charset="0"/>
+                <a:cs typeface="Lato Italics" panose="020B0604020202020204" charset="0"/>
+              </a:rPr>
+              <a:t>    </a:t>
+            </a:r>
           </a:p>
         </p:txBody>
       </p:sp>
@@ -6313,6 +7078,13 @@
               <a:srgbClr val="2B4A9D"/>
             </a:solidFill>
           </p:spPr>
+          <p:txBody>
+            <a:bodyPr/>
+            <a:lstStyle/>
+            <a:p>
+              <a:endParaRPr lang="es-ES"/>
+            </a:p>
+          </p:txBody>
         </p:sp>
       </p:grpSp>
       <p:grpSp>
@@ -6380,6 +7152,13 @@
               <a:srgbClr val="5271FF"/>
             </a:solidFill>
           </p:spPr>
+          <p:txBody>
+            <a:bodyPr/>
+            <a:lstStyle/>
+            <a:p>
+              <a:endParaRPr lang="es-ES"/>
+            </a:p>
+          </p:txBody>
         </p:sp>
       </p:grpSp>
       <p:grpSp>
@@ -6466,6 +7245,13 @@
               <a:srgbClr val="FFFFFF"/>
             </a:solidFill>
           </p:spPr>
+          <p:txBody>
+            <a:bodyPr/>
+            <a:lstStyle/>
+            <a:p>
+              <a:endParaRPr lang="es-ES"/>
+            </a:p>
+          </p:txBody>
         </p:sp>
       </p:grpSp>
       <p:grpSp>
@@ -6533,6 +7319,13 @@
               <a:srgbClr val="5271FF"/>
             </a:solidFill>
           </p:spPr>
+          <p:txBody>
+            <a:bodyPr/>
+            <a:lstStyle/>
+            <a:p>
+              <a:endParaRPr lang="es-ES"/>
+            </a:p>
+          </p:txBody>
         </p:sp>
       </p:grpSp>
       <p:grpSp>
@@ -6619,6 +7412,13 @@
               <a:srgbClr val="FFFFFF"/>
             </a:solidFill>
           </p:spPr>
+          <p:txBody>
+            <a:bodyPr/>
+            <a:lstStyle/>
+            <a:p>
+              <a:endParaRPr lang="es-ES"/>
+            </a:p>
+          </p:txBody>
         </p:sp>
       </p:grpSp>
       <p:grpSp>
@@ -6686,6 +7486,13 @@
               <a:srgbClr val="5271FF"/>
             </a:solidFill>
           </p:spPr>
+          <p:txBody>
+            <a:bodyPr/>
+            <a:lstStyle/>
+            <a:p>
+              <a:endParaRPr lang="es-ES"/>
+            </a:p>
+          </p:txBody>
         </p:sp>
       </p:grpSp>
       <p:grpSp>
@@ -6772,6 +7579,13 @@
               <a:srgbClr val="FFFFFF"/>
             </a:solidFill>
           </p:spPr>
+          <p:txBody>
+            <a:bodyPr/>
+            <a:lstStyle/>
+            <a:p>
+              <a:endParaRPr lang="es-ES"/>
+            </a:p>
+          </p:txBody>
         </p:sp>
       </p:grpSp>
       <p:sp>
@@ -7059,6 +7873,13 @@
               <a:srgbClr val="2B4A9D"/>
             </a:solidFill>
           </p:spPr>
+          <p:txBody>
+            <a:bodyPr/>
+            <a:lstStyle/>
+            <a:p>
+              <a:endParaRPr lang="es-ES"/>
+            </a:p>
+          </p:txBody>
         </p:sp>
       </p:grpSp>
       <p:sp>
@@ -7118,6 +7939,13 @@
             </a:stretch>
           </a:blipFill>
         </p:spPr>
+        <p:txBody>
+          <a:bodyPr/>
+          <a:lstStyle/>
+          <a:p>
+            <a:endParaRPr lang="es-ES"/>
+          </a:p>
+        </p:txBody>
       </p:sp>
       <p:sp>
         <p:nvSpPr>
@@ -7264,6 +8092,13 @@
               <a:srgbClr val="5271FF"/>
             </a:solidFill>
           </p:spPr>
+          <p:txBody>
+            <a:bodyPr/>
+            <a:lstStyle/>
+            <a:p>
+              <a:endParaRPr lang="es-ES"/>
+            </a:p>
+          </p:txBody>
         </p:sp>
       </p:grpSp>
       <p:grpSp>
@@ -7350,6 +8185,13 @@
               <a:srgbClr val="FFFFFF"/>
             </a:solidFill>
           </p:spPr>
+          <p:txBody>
+            <a:bodyPr/>
+            <a:lstStyle/>
+            <a:p>
+              <a:endParaRPr lang="es-ES"/>
+            </a:p>
+          </p:txBody>
         </p:sp>
       </p:grpSp>
       <p:grpSp>
@@ -7417,6 +8259,13 @@
               <a:srgbClr val="5271FF"/>
             </a:solidFill>
           </p:spPr>
+          <p:txBody>
+            <a:bodyPr/>
+            <a:lstStyle/>
+            <a:p>
+              <a:endParaRPr lang="es-ES"/>
+            </a:p>
+          </p:txBody>
         </p:sp>
       </p:grpSp>
       <p:grpSp>
@@ -7503,6 +8352,13 @@
               <a:srgbClr val="FFFFFF"/>
             </a:solidFill>
           </p:spPr>
+          <p:txBody>
+            <a:bodyPr/>
+            <a:lstStyle/>
+            <a:p>
+              <a:endParaRPr lang="es-ES"/>
+            </a:p>
+          </p:txBody>
         </p:sp>
       </p:grpSp>
       <p:grpSp>
@@ -7570,6 +8426,13 @@
               <a:srgbClr val="5271FF"/>
             </a:solidFill>
           </p:spPr>
+          <p:txBody>
+            <a:bodyPr/>
+            <a:lstStyle/>
+            <a:p>
+              <a:endParaRPr lang="es-ES"/>
+            </a:p>
+          </p:txBody>
         </p:sp>
       </p:grpSp>
       <p:grpSp>
@@ -7656,6 +8519,13 @@
               <a:srgbClr val="FFFFFF"/>
             </a:solidFill>
           </p:spPr>
+          <p:txBody>
+            <a:bodyPr/>
+            <a:lstStyle/>
+            <a:p>
+              <a:endParaRPr lang="es-ES"/>
+            </a:p>
+          </p:txBody>
         </p:sp>
       </p:grpSp>
       <p:sp>
@@ -7767,7 +8637,7 @@
         <p:spPr>
           <a:xfrm>
             <a:off x="3581400" y="2553575"/>
-            <a:ext cx="14097000" cy="2585323"/>
+            <a:ext cx="14097000" cy="5909310"/>
           </a:xfrm>
           <a:prstGeom prst="rect">
             <a:avLst/>
@@ -7797,7 +8667,7 @@
                 <a:ea typeface="Lato Italics" panose="020B0604020202020204" charset="0"/>
                 <a:cs typeface="Lato Italics" panose="020B0604020202020204" charset="0"/>
               </a:rPr>
-              <a:t>: </a:t>
+              <a:t>: Inexistentes</a:t>
             </a:r>
           </a:p>
           <a:p>
@@ -7808,6 +8678,32 @@
             </a:endParaRPr>
           </a:p>
           <a:p>
+            <a:r>
+              <a:rPr lang="es-ES" sz="3600" dirty="0">
+                <a:latin typeface="Lato Italics" panose="020B0604020202020204" charset="0"/>
+                <a:ea typeface="Lato Italics" panose="020B0604020202020204" charset="0"/>
+                <a:cs typeface="Lato Italics" panose="020B0604020202020204" charset="0"/>
+              </a:rPr>
+              <a:t>Valores marcados como </a:t>
+            </a:r>
+            <a:r>
+              <a:rPr lang="es-ES" sz="3600" dirty="0" err="1">
+                <a:latin typeface="Lato Italics" panose="020B0604020202020204" charset="0"/>
+                <a:ea typeface="Lato Italics" panose="020B0604020202020204" charset="0"/>
+                <a:cs typeface="Lato Italics" panose="020B0604020202020204" charset="0"/>
+              </a:rPr>
+              <a:t>outliers</a:t>
+            </a:r>
+            <a:r>
+              <a:rPr lang="es-ES" sz="3600" dirty="0">
+                <a:latin typeface="Lato Italics" panose="020B0604020202020204" charset="0"/>
+                <a:ea typeface="Lato Italics" panose="020B0604020202020204" charset="0"/>
+                <a:cs typeface="Lato Italics" panose="020B0604020202020204" charset="0"/>
+              </a:rPr>
+              <a:t> no suelen serlo. </a:t>
+            </a:r>
+          </a:p>
+          <a:p>
             <a:endParaRPr lang="es-ES" sz="3600" dirty="0">
               <a:latin typeface="Lato Italics" panose="020B0604020202020204" charset="0"/>
               <a:ea typeface="Lato Italics" panose="020B0604020202020204" charset="0"/>
@@ -7815,14 +8711,154 @@
             </a:endParaRPr>
           </a:p>
           <a:p>
+            <a:r>
+              <a:rPr lang="es-ES" sz="3600" dirty="0">
+                <a:latin typeface="Lato Italics" panose="020B0604020202020204" charset="0"/>
+                <a:ea typeface="Lato Italics" panose="020B0604020202020204" charset="0"/>
+                <a:cs typeface="Lato Italics" panose="020B0604020202020204" charset="0"/>
+              </a:rPr>
+              <a:t>Ejemplo: Goles en propia. Al ser habitualmente 0, un gol en propia aparece como </a:t>
+            </a:r>
+            <a:r>
+              <a:rPr lang="es-ES" sz="3600" dirty="0" err="1">
+                <a:latin typeface="Lato Italics" panose="020B0604020202020204" charset="0"/>
+                <a:ea typeface="Lato Italics" panose="020B0604020202020204" charset="0"/>
+                <a:cs typeface="Lato Italics" panose="020B0604020202020204" charset="0"/>
+              </a:rPr>
+              <a:t>outlier</a:t>
+            </a:r>
+            <a:r>
+              <a:rPr lang="es-ES" sz="3600" dirty="0">
+                <a:latin typeface="Lato Italics" panose="020B0604020202020204" charset="0"/>
+                <a:ea typeface="Lato Italics" panose="020B0604020202020204" charset="0"/>
+                <a:cs typeface="Lato Italics" panose="020B0604020202020204" charset="0"/>
+              </a:rPr>
+              <a:t>.</a:t>
+            </a:r>
+          </a:p>
+          <a:p>
+            <a:r>
+              <a:rPr lang="es-ES" sz="3600" dirty="0">
+                <a:latin typeface="Lato Italics" panose="020B0604020202020204" charset="0"/>
+                <a:ea typeface="Lato Italics" panose="020B0604020202020204" charset="0"/>
+                <a:cs typeface="Lato Italics" panose="020B0604020202020204" charset="0"/>
+              </a:rPr>
+              <a:t> </a:t>
+            </a:r>
+          </a:p>
+          <a:p>
             <a:endParaRPr lang="es-ES" sz="3600" dirty="0">
               <a:latin typeface="Lato Italics" panose="020B0604020202020204" charset="0"/>
               <a:ea typeface="Lato Italics" panose="020B0604020202020204" charset="0"/>
               <a:cs typeface="Lato Italics" panose="020B0604020202020204" charset="0"/>
             </a:endParaRPr>
           </a:p>
+          <a:p>
+            <a:endParaRPr lang="es-ES" sz="3600" dirty="0">
+              <a:latin typeface="Lato Italics" panose="020B0604020202020204" charset="0"/>
+              <a:ea typeface="Lato Italics" panose="020B0604020202020204" charset="0"/>
+              <a:cs typeface="Lato Italics" panose="020B0604020202020204" charset="0"/>
+            </a:endParaRPr>
+          </a:p>
+          <a:p>
+            <a:endParaRPr lang="es-ES" sz="3600" dirty="0">
+              <a:latin typeface="Lato Italics" panose="020B0604020202020204" charset="0"/>
+              <a:ea typeface="Lato Italics" panose="020B0604020202020204" charset="0"/>
+              <a:cs typeface="Lato Italics" panose="020B0604020202020204" charset="0"/>
+            </a:endParaRPr>
+          </a:p>
         </p:txBody>
       </p:sp>
+      <p:pic>
+        <p:nvPicPr>
+          <p:cNvPr id="16" name="Imagen 15">
+            <a:extLst>
+              <a:ext uri="{FF2B5EF4-FFF2-40B4-BE49-F238E27FC236}">
+                <a16:creationId xmlns:a16="http://schemas.microsoft.com/office/drawing/2014/main" id="{EBE8F9D9-C932-263C-78DA-9F97BB47DF7C}"/>
+              </a:ext>
+            </a:extLst>
+          </p:cNvPr>
+          <p:cNvPicPr>
+            <a:picLocks noChangeAspect="1"/>
+          </p:cNvPicPr>
+          <p:nvPr/>
+        </p:nvPicPr>
+        <p:blipFill>
+          <a:blip r:embed="rId2"/>
+          <a:stretch>
+            <a:fillRect/>
+          </a:stretch>
+        </p:blipFill>
+        <p:spPr>
+          <a:xfrm>
+            <a:off x="4359936" y="6430231"/>
+            <a:ext cx="2802864" cy="3776273"/>
+          </a:xfrm>
+          <a:prstGeom prst="rect">
+            <a:avLst/>
+          </a:prstGeom>
+        </p:spPr>
+      </p:pic>
+      <p:pic>
+        <p:nvPicPr>
+          <p:cNvPr id="20" name="Imagen 19">
+            <a:extLst>
+              <a:ext uri="{FF2B5EF4-FFF2-40B4-BE49-F238E27FC236}">
+                <a16:creationId xmlns:a16="http://schemas.microsoft.com/office/drawing/2014/main" id="{8C0A4FF3-9C18-9446-421D-25D0851CDE0F}"/>
+              </a:ext>
+            </a:extLst>
+          </p:cNvPr>
+          <p:cNvPicPr>
+            <a:picLocks noChangeAspect="1"/>
+          </p:cNvPicPr>
+          <p:nvPr/>
+        </p:nvPicPr>
+        <p:blipFill>
+          <a:blip r:embed="rId3"/>
+          <a:stretch>
+            <a:fillRect/>
+          </a:stretch>
+        </p:blipFill>
+        <p:spPr>
+          <a:xfrm>
+            <a:off x="12115800" y="6424140"/>
+            <a:ext cx="2590800" cy="3746908"/>
+          </a:xfrm>
+          <a:prstGeom prst="rect">
+            <a:avLst/>
+          </a:prstGeom>
+        </p:spPr>
+      </p:pic>
+      <p:pic>
+        <p:nvPicPr>
+          <p:cNvPr id="22" name="Imagen 21">
+            <a:extLst>
+              <a:ext uri="{FF2B5EF4-FFF2-40B4-BE49-F238E27FC236}">
+                <a16:creationId xmlns:a16="http://schemas.microsoft.com/office/drawing/2014/main" id="{F820E2F4-A10B-778C-0CAF-3AE5BD0671E1}"/>
+              </a:ext>
+            </a:extLst>
+          </p:cNvPr>
+          <p:cNvPicPr>
+            <a:picLocks noChangeAspect="1"/>
+          </p:cNvPicPr>
+          <p:nvPr/>
+        </p:nvPicPr>
+        <p:blipFill>
+          <a:blip r:embed="rId4"/>
+          <a:stretch>
+            <a:fillRect/>
+          </a:stretch>
+        </p:blipFill>
+        <p:spPr>
+          <a:xfrm>
+            <a:off x="8301282" y="6389805"/>
+            <a:ext cx="2440511" cy="3773623"/>
+          </a:xfrm>
+          <a:prstGeom prst="rect">
+            <a:avLst/>
+          </a:prstGeom>
+        </p:spPr>
+      </p:pic>
     </p:spTree>
     <p:extLst>
       <p:ext uri="{BB962C8B-B14F-4D97-AF65-F5344CB8AC3E}">
@@ -7924,6 +8960,13 @@
               <a:srgbClr val="5271FF"/>
             </a:solidFill>
           </p:spPr>
+          <p:txBody>
+            <a:bodyPr/>
+            <a:lstStyle/>
+            <a:p>
+              <a:endParaRPr lang="es-ES"/>
+            </a:p>
+          </p:txBody>
         </p:sp>
       </p:grpSp>
       <p:grpSp>
@@ -8010,6 +9053,13 @@
               <a:srgbClr val="FFFFFF"/>
             </a:solidFill>
           </p:spPr>
+          <p:txBody>
+            <a:bodyPr/>
+            <a:lstStyle/>
+            <a:p>
+              <a:endParaRPr lang="es-ES"/>
+            </a:p>
+          </p:txBody>
         </p:sp>
       </p:grpSp>
       <p:grpSp>
@@ -8077,6 +9127,13 @@
               <a:srgbClr val="5271FF"/>
             </a:solidFill>
           </p:spPr>
+          <p:txBody>
+            <a:bodyPr/>
+            <a:lstStyle/>
+            <a:p>
+              <a:endParaRPr lang="es-ES"/>
+            </a:p>
+          </p:txBody>
         </p:sp>
       </p:grpSp>
       <p:grpSp>
@@ -8163,6 +9220,13 @@
               <a:srgbClr val="FFFFFF"/>
             </a:solidFill>
           </p:spPr>
+          <p:txBody>
+            <a:bodyPr/>
+            <a:lstStyle/>
+            <a:p>
+              <a:endParaRPr lang="es-ES"/>
+            </a:p>
+          </p:txBody>
         </p:sp>
       </p:grpSp>
       <p:grpSp>
@@ -8230,6 +9294,13 @@
               <a:srgbClr val="5271FF"/>
             </a:solidFill>
           </p:spPr>
+          <p:txBody>
+            <a:bodyPr/>
+            <a:lstStyle/>
+            <a:p>
+              <a:endParaRPr lang="es-ES"/>
+            </a:p>
+          </p:txBody>
         </p:sp>
       </p:grpSp>
       <p:grpSp>
@@ -8316,6 +9387,13 @@
               <a:srgbClr val="FFFFFF"/>
             </a:solidFill>
           </p:spPr>
+          <p:txBody>
+            <a:bodyPr/>
+            <a:lstStyle/>
+            <a:p>
+              <a:endParaRPr lang="es-ES"/>
+            </a:p>
+          </p:txBody>
         </p:sp>
       </p:grpSp>
       <p:sp>
@@ -8427,7 +9505,7 @@
         <p:spPr>
           <a:xfrm>
             <a:off x="3581400" y="2553575"/>
-            <a:ext cx="14097000" cy="2585323"/>
+            <a:ext cx="14097000" cy="5909310"/>
           </a:xfrm>
           <a:prstGeom prst="rect">
             <a:avLst/>
@@ -8449,7 +9527,7 @@
                 <a:ea typeface="Lato Italics" panose="020B0604020202020204" charset="0"/>
                 <a:cs typeface="Lato Italics" panose="020B0604020202020204" charset="0"/>
               </a:rPr>
-              <a:t>Gráficas: </a:t>
+              <a:t>Gráficas: En la mayoría de los casos conforme el eje x avanza el y baja, esto es porque por ejemplo</a:t>
             </a:r>
           </a:p>
           <a:p>
@@ -8460,6 +9538,52 @@
             </a:endParaRPr>
           </a:p>
           <a:p>
+            <a:r>
+              <a:rPr lang="es-ES" sz="3600" dirty="0">
+                <a:latin typeface="Lato Italics" panose="020B0604020202020204" charset="0"/>
+                <a:ea typeface="Lato Italics" panose="020B0604020202020204" charset="0"/>
+                <a:cs typeface="Lato Italics" panose="020B0604020202020204" charset="0"/>
+              </a:rPr>
+              <a:t>Similar a los </a:t>
+            </a:r>
+            <a:r>
+              <a:rPr lang="es-ES" sz="3600" dirty="0" err="1">
+                <a:latin typeface="Lato Italics" panose="020B0604020202020204" charset="0"/>
+                <a:ea typeface="Lato Italics" panose="020B0604020202020204" charset="0"/>
+                <a:cs typeface="Lato Italics" panose="020B0604020202020204" charset="0"/>
+              </a:rPr>
+              <a:t>outliers</a:t>
+            </a:r>
+            <a:r>
+              <a:rPr lang="es-ES" sz="3600" dirty="0">
+                <a:latin typeface="Lato Italics" panose="020B0604020202020204" charset="0"/>
+                <a:ea typeface="Lato Italics" panose="020B0604020202020204" charset="0"/>
+                <a:cs typeface="Lato Italics" panose="020B0604020202020204" charset="0"/>
+              </a:rPr>
+              <a:t>, los valores aparentemente atípicos afectan mucho a nuestros datos. </a:t>
+            </a:r>
+          </a:p>
+          <a:p>
+            <a:r>
+              <a:rPr lang="es-ES" sz="3600" dirty="0">
+                <a:latin typeface="Lato Italics" panose="020B0604020202020204" charset="0"/>
+                <a:ea typeface="Lato Italics" panose="020B0604020202020204" charset="0"/>
+                <a:cs typeface="Lato Italics" panose="020B0604020202020204" charset="0"/>
+              </a:rPr>
+              <a:t>Ejemplo: Lo normal es recibir pocas tarjetas amarillas.</a:t>
+            </a:r>
+          </a:p>
+          <a:p>
+            <a:r>
+              <a:rPr lang="es-ES" sz="3600" dirty="0">
+                <a:latin typeface="Lato Italics" panose="020B0604020202020204" charset="0"/>
+                <a:ea typeface="Lato Italics" panose="020B0604020202020204" charset="0"/>
+                <a:cs typeface="Lato Italics" panose="020B0604020202020204" charset="0"/>
+              </a:rPr>
+              <a:t>En ocasiones, hay jugadores que han recibido muchas (15 tarjetas)</a:t>
+            </a:r>
+          </a:p>
+          <a:p>
             <a:endParaRPr lang="es-ES" sz="3600" dirty="0">
               <a:latin typeface="Lato Italics" panose="020B0604020202020204" charset="0"/>
               <a:ea typeface="Lato Italics" panose="020B0604020202020204" charset="0"/>
@@ -8473,8 +9597,180 @@
               <a:cs typeface="Lato Italics" panose="020B0604020202020204" charset="0"/>
             </a:endParaRPr>
           </a:p>
+          <a:p>
+            <a:endParaRPr lang="es-ES" sz="3600" dirty="0">
+              <a:latin typeface="Lato Italics" panose="020B0604020202020204" charset="0"/>
+              <a:ea typeface="Lato Italics" panose="020B0604020202020204" charset="0"/>
+              <a:cs typeface="Lato Italics" panose="020B0604020202020204" charset="0"/>
+            </a:endParaRPr>
+          </a:p>
         </p:txBody>
       </p:sp>
+      <p:pic>
+        <p:nvPicPr>
+          <p:cNvPr id="1030" name="Picture 6">
+            <a:extLst>
+              <a:ext uri="{FF2B5EF4-FFF2-40B4-BE49-F238E27FC236}">
+                <a16:creationId xmlns:a16="http://schemas.microsoft.com/office/drawing/2014/main" id="{629CC4DC-7B45-BA61-F9CA-514A046D2E3B}"/>
+              </a:ext>
+            </a:extLst>
+          </p:cNvPr>
+          <p:cNvPicPr>
+            <a:picLocks noChangeAspect="1" noChangeArrowheads="1"/>
+          </p:cNvPicPr>
+          <p:nvPr/>
+        </p:nvPicPr>
+        <p:blipFill rotWithShape="1">
+          <a:blip r:embed="rId2">
+            <a:extLst>
+              <a:ext uri="{28A0092B-C50C-407E-A947-70E740481C1C}">
+                <a14:useLocalDpi xmlns:a14="http://schemas.microsoft.com/office/drawing/2010/main" val="0"/>
+              </a:ext>
+            </a:extLst>
+          </a:blip>
+          <a:srcRect r="49142"/>
+          <a:stretch/>
+        </p:blipFill>
+        <p:spPr bwMode="auto">
+          <a:xfrm>
+            <a:off x="4664351" y="6740895"/>
+            <a:ext cx="2365965" cy="3504138"/>
+          </a:xfrm>
+          <a:prstGeom prst="rect">
+            <a:avLst/>
+          </a:prstGeom>
+          <a:noFill/>
+          <a:extLst>
+            <a:ext uri="{909E8E84-426E-40DD-AFC4-6F175D3DCCD1}">
+              <a14:hiddenFill xmlns:a14="http://schemas.microsoft.com/office/drawing/2010/main">
+                <a:solidFill>
+                  <a:srgbClr val="FFFFFF"/>
+                </a:solidFill>
+              </a14:hiddenFill>
+            </a:ext>
+          </a:extLst>
+        </p:spPr>
+      </p:pic>
+      <p:pic>
+        <p:nvPicPr>
+          <p:cNvPr id="1026" name="Picture 2">
+            <a:extLst>
+              <a:ext uri="{FF2B5EF4-FFF2-40B4-BE49-F238E27FC236}">
+                <a16:creationId xmlns:a16="http://schemas.microsoft.com/office/drawing/2014/main" id="{D153072C-FFE7-4FF9-88FE-0DDB7CEFDC7A}"/>
+              </a:ext>
+            </a:extLst>
+          </p:cNvPr>
+          <p:cNvPicPr>
+            <a:picLocks noChangeAspect="1" noChangeArrowheads="1"/>
+          </p:cNvPicPr>
+          <p:nvPr/>
+        </p:nvPicPr>
+        <p:blipFill rotWithShape="1">
+          <a:blip r:embed="rId3">
+            <a:extLst>
+              <a:ext uri="{28A0092B-C50C-407E-A947-70E740481C1C}">
+                <a14:useLocalDpi xmlns:a14="http://schemas.microsoft.com/office/drawing/2010/main" val="0"/>
+              </a:ext>
+            </a:extLst>
+          </a:blip>
+          <a:srcRect r="46736"/>
+          <a:stretch/>
+        </p:blipFill>
+        <p:spPr bwMode="auto">
+          <a:xfrm>
+            <a:off x="13645080" y="6757445"/>
+            <a:ext cx="2592064" cy="3519646"/>
+          </a:xfrm>
+          <a:prstGeom prst="rect">
+            <a:avLst/>
+          </a:prstGeom>
+          <a:noFill/>
+          <a:extLst>
+            <a:ext uri="{909E8E84-426E-40DD-AFC4-6F175D3DCCD1}">
+              <a14:hiddenFill xmlns:a14="http://schemas.microsoft.com/office/drawing/2010/main">
+                <a:solidFill>
+                  <a:srgbClr val="FFFFFF"/>
+                </a:solidFill>
+              </a14:hiddenFill>
+            </a:ext>
+          </a:extLst>
+        </p:spPr>
+      </p:pic>
+      <p:pic>
+        <p:nvPicPr>
+          <p:cNvPr id="1028" name="Picture 4">
+            <a:extLst>
+              <a:ext uri="{FF2B5EF4-FFF2-40B4-BE49-F238E27FC236}">
+                <a16:creationId xmlns:a16="http://schemas.microsoft.com/office/drawing/2014/main" id="{D7F3E5C6-9DC4-9DA1-8A82-4C59030CA1C6}"/>
+              </a:ext>
+            </a:extLst>
+          </p:cNvPr>
+          <p:cNvPicPr>
+            <a:picLocks noChangeAspect="1" noChangeArrowheads="1"/>
+          </p:cNvPicPr>
+          <p:nvPr/>
+        </p:nvPicPr>
+        <p:blipFill rotWithShape="1">
+          <a:blip r:embed="rId4">
+            <a:extLst>
+              <a:ext uri="{28A0092B-C50C-407E-A947-70E740481C1C}">
+                <a14:useLocalDpi xmlns:a14="http://schemas.microsoft.com/office/drawing/2010/main" val="0"/>
+              </a:ext>
+            </a:extLst>
+          </a:blip>
+          <a:srcRect r="49362"/>
+          <a:stretch/>
+        </p:blipFill>
+        <p:spPr bwMode="auto">
+          <a:xfrm>
+            <a:off x="7914170" y="6763789"/>
+            <a:ext cx="2459660" cy="3504138"/>
+          </a:xfrm>
+          <a:prstGeom prst="rect">
+            <a:avLst/>
+          </a:prstGeom>
+          <a:noFill/>
+          <a:extLst>
+            <a:ext uri="{909E8E84-426E-40DD-AFC4-6F175D3DCCD1}">
+              <a14:hiddenFill xmlns:a14="http://schemas.microsoft.com/office/drawing/2010/main">
+                <a:solidFill>
+                  <a:srgbClr val="FFFFFF"/>
+                </a:solidFill>
+              </a14:hiddenFill>
+            </a:ext>
+          </a:extLst>
+        </p:spPr>
+      </p:pic>
+      <p:pic>
+        <p:nvPicPr>
+          <p:cNvPr id="16" name="Imagen 15">
+            <a:extLst>
+              <a:ext uri="{FF2B5EF4-FFF2-40B4-BE49-F238E27FC236}">
+                <a16:creationId xmlns:a16="http://schemas.microsoft.com/office/drawing/2014/main" id="{9930E595-C072-0D84-A2FB-70C1BA88BBF9}"/>
+              </a:ext>
+            </a:extLst>
+          </p:cNvPr>
+          <p:cNvPicPr>
+            <a:picLocks noChangeAspect="1"/>
+          </p:cNvPicPr>
+          <p:nvPr/>
+        </p:nvPicPr>
+        <p:blipFill>
+          <a:blip r:embed="rId5"/>
+          <a:stretch>
+            <a:fillRect/>
+          </a:stretch>
+        </p:blipFill>
+        <p:spPr>
+          <a:xfrm>
+            <a:off x="10629900" y="6718035"/>
+            <a:ext cx="2710442" cy="3481244"/>
+          </a:xfrm>
+          <a:prstGeom prst="rect">
+            <a:avLst/>
+          </a:prstGeom>
+        </p:spPr>
+      </p:pic>
     </p:spTree>
     <p:extLst>
       <p:ext uri="{BB962C8B-B14F-4D97-AF65-F5344CB8AC3E}">
@@ -8576,6 +9872,13 @@
               <a:srgbClr val="5271FF"/>
             </a:solidFill>
           </p:spPr>
+          <p:txBody>
+            <a:bodyPr/>
+            <a:lstStyle/>
+            <a:p>
+              <a:endParaRPr lang="es-ES"/>
+            </a:p>
+          </p:txBody>
         </p:sp>
       </p:grpSp>
       <p:grpSp>
@@ -8662,6 +9965,13 @@
               <a:srgbClr val="FFFFFF"/>
             </a:solidFill>
           </p:spPr>
+          <p:txBody>
+            <a:bodyPr/>
+            <a:lstStyle/>
+            <a:p>
+              <a:endParaRPr lang="es-ES"/>
+            </a:p>
+          </p:txBody>
         </p:sp>
       </p:grpSp>
       <p:grpSp>
@@ -8729,6 +10039,13 @@
               <a:srgbClr val="5271FF"/>
             </a:solidFill>
           </p:spPr>
+          <p:txBody>
+            <a:bodyPr/>
+            <a:lstStyle/>
+            <a:p>
+              <a:endParaRPr lang="es-ES"/>
+            </a:p>
+          </p:txBody>
         </p:sp>
       </p:grpSp>
       <p:grpSp>
@@ -8815,6 +10132,13 @@
               <a:srgbClr val="FFFFFF"/>
             </a:solidFill>
           </p:spPr>
+          <p:txBody>
+            <a:bodyPr/>
+            <a:lstStyle/>
+            <a:p>
+              <a:endParaRPr lang="es-ES"/>
+            </a:p>
+          </p:txBody>
         </p:sp>
       </p:grpSp>
       <p:grpSp>
@@ -8882,6 +10206,13 @@
               <a:srgbClr val="5271FF"/>
             </a:solidFill>
           </p:spPr>
+          <p:txBody>
+            <a:bodyPr/>
+            <a:lstStyle/>
+            <a:p>
+              <a:endParaRPr lang="es-ES"/>
+            </a:p>
+          </p:txBody>
         </p:sp>
       </p:grpSp>
       <p:grpSp>
@@ -8968,6 +10299,13 @@
               <a:srgbClr val="FFFFFF"/>
             </a:solidFill>
           </p:spPr>
+          <p:txBody>
+            <a:bodyPr/>
+            <a:lstStyle/>
+            <a:p>
+              <a:endParaRPr lang="es-ES"/>
+            </a:p>
+          </p:txBody>
         </p:sp>
       </p:grpSp>
       <p:sp>
@@ -9078,8 +10416,8 @@
         </p:nvSpPr>
         <p:spPr>
           <a:xfrm>
-            <a:off x="3581400" y="2553575"/>
-            <a:ext cx="14097000" cy="2585323"/>
+            <a:off x="3581400" y="2384896"/>
+            <a:ext cx="14097000" cy="5909310"/>
           </a:xfrm>
           <a:prstGeom prst="rect">
             <a:avLst/>
@@ -9101,7 +10439,7 @@
                 <a:ea typeface="Lato Italics" panose="020B0604020202020204" charset="0"/>
                 <a:cs typeface="Lato Italics" panose="020B0604020202020204" charset="0"/>
               </a:rPr>
-              <a:t>Distribución normal y derivados: </a:t>
+              <a:t>Distribución normal y derivados:</a:t>
             </a:r>
           </a:p>
           <a:p>
@@ -9112,6 +10450,42 @@
             </a:endParaRPr>
           </a:p>
           <a:p>
+            <a:r>
+              <a:rPr lang="es-ES" sz="3600" dirty="0">
+                <a:latin typeface="Lato Italics" panose="020B0604020202020204" charset="0"/>
+                <a:ea typeface="Lato Italics" panose="020B0604020202020204" charset="0"/>
+                <a:cs typeface="Lato Italics" panose="020B0604020202020204" charset="0"/>
+              </a:rPr>
+              <a:t>Solo </a:t>
+            </a:r>
+            <a:r>
+              <a:rPr lang="es-ES" sz="3600" dirty="0" err="1">
+                <a:latin typeface="Lato Italics" panose="020B0604020202020204" charset="0"/>
+                <a:ea typeface="Lato Italics" panose="020B0604020202020204" charset="0"/>
+                <a:cs typeface="Lato Italics" panose="020B0604020202020204" charset="0"/>
+              </a:rPr>
+              <a:t>height</a:t>
+            </a:r>
+            <a:r>
+              <a:rPr lang="es-ES" sz="3600" dirty="0">
+                <a:latin typeface="Lato Italics" panose="020B0604020202020204" charset="0"/>
+                <a:ea typeface="Lato Italics" panose="020B0604020202020204" charset="0"/>
+                <a:cs typeface="Lato Italics" panose="020B0604020202020204" charset="0"/>
+              </a:rPr>
+              <a:t> cumple normalidad.</a:t>
+            </a:r>
+          </a:p>
+          <a:p>
+            <a:r>
+              <a:rPr lang="es-ES" sz="3600" dirty="0">
+                <a:latin typeface="Lato Italics" panose="020B0604020202020204" charset="0"/>
+                <a:ea typeface="Lato Italics" panose="020B0604020202020204" charset="0"/>
+                <a:cs typeface="Lato Italics" panose="020B0604020202020204" charset="0"/>
+              </a:rPr>
+              <a:t>Muchos datos se acercan, pero cuentan con ciertos valores algo especiales: alto número de goles.</a:t>
+            </a:r>
+          </a:p>
+          <a:p>
             <a:endParaRPr lang="es-ES" sz="3600" dirty="0">
               <a:latin typeface="Lato Italics" panose="020B0604020202020204" charset="0"/>
               <a:ea typeface="Lato Italics" panose="020B0604020202020204" charset="0"/>
@@ -9119,14 +10493,179 @@
             </a:endParaRPr>
           </a:p>
           <a:p>
+            <a:r>
+              <a:rPr lang="es-ES" sz="3600" dirty="0">
+                <a:latin typeface="Lato Italics" panose="020B0604020202020204" charset="0"/>
+                <a:ea typeface="Lato Italics" panose="020B0604020202020204" charset="0"/>
+                <a:cs typeface="Lato Italics" panose="020B0604020202020204" charset="0"/>
+              </a:rPr>
+              <a:t>No podemos aplicar muchas transformaciones: deforman la realidad  </a:t>
+            </a:r>
+          </a:p>
+          <a:p>
             <a:endParaRPr lang="es-ES" sz="3600" dirty="0">
               <a:latin typeface="Lato Italics" panose="020B0604020202020204" charset="0"/>
               <a:ea typeface="Lato Italics" panose="020B0604020202020204" charset="0"/>
               <a:cs typeface="Lato Italics" panose="020B0604020202020204" charset="0"/>
             </a:endParaRPr>
           </a:p>
+          <a:p>
+            <a:endParaRPr lang="es-ES" sz="3600" dirty="0">
+              <a:latin typeface="Lato Italics" panose="020B0604020202020204" charset="0"/>
+              <a:ea typeface="Lato Italics" panose="020B0604020202020204" charset="0"/>
+              <a:cs typeface="Lato Italics" panose="020B0604020202020204" charset="0"/>
+            </a:endParaRPr>
+          </a:p>
+          <a:p>
+            <a:endParaRPr lang="es-ES" sz="3600" dirty="0">
+              <a:latin typeface="Lato Italics" panose="020B0604020202020204" charset="0"/>
+              <a:ea typeface="Lato Italics" panose="020B0604020202020204" charset="0"/>
+              <a:cs typeface="Lato Italics" panose="020B0604020202020204" charset="0"/>
+            </a:endParaRPr>
+          </a:p>
         </p:txBody>
       </p:sp>
+      <p:pic>
+        <p:nvPicPr>
+          <p:cNvPr id="1032" name="Picture 8">
+            <a:extLst>
+              <a:ext uri="{FF2B5EF4-FFF2-40B4-BE49-F238E27FC236}">
+                <a16:creationId xmlns:a16="http://schemas.microsoft.com/office/drawing/2014/main" id="{8D904349-A3B2-0826-C449-CF354852E1FC}"/>
+              </a:ext>
+            </a:extLst>
+          </p:cNvPr>
+          <p:cNvPicPr>
+            <a:picLocks noChangeAspect="1" noChangeArrowheads="1"/>
+          </p:cNvPicPr>
+          <p:nvPr/>
+        </p:nvPicPr>
+        <p:blipFill>
+          <a:blip r:embed="rId2">
+            <a:extLst>
+              <a:ext uri="{28A0092B-C50C-407E-A947-70E740481C1C}">
+                <a14:useLocalDpi xmlns:a14="http://schemas.microsoft.com/office/drawing/2010/main" val="0"/>
+              </a:ext>
+            </a:extLst>
+          </a:blip>
+          <a:srcRect/>
+          <a:stretch>
+            <a:fillRect/>
+          </a:stretch>
+        </p:blipFill>
+        <p:spPr bwMode="auto">
+          <a:xfrm>
+            <a:off x="12362932" y="6568643"/>
+            <a:ext cx="4892948" cy="3848100"/>
+          </a:xfrm>
+          <a:prstGeom prst="rect">
+            <a:avLst/>
+          </a:prstGeom>
+          <a:noFill/>
+          <a:extLst>
+            <a:ext uri="{909E8E84-426E-40DD-AFC4-6F175D3DCCD1}">
+              <a14:hiddenFill xmlns:a14="http://schemas.microsoft.com/office/drawing/2010/main">
+                <a:solidFill>
+                  <a:srgbClr val="FFFFFF"/>
+                </a:solidFill>
+              </a14:hiddenFill>
+            </a:ext>
+          </a:extLst>
+        </p:spPr>
+      </p:pic>
+      <p:pic>
+        <p:nvPicPr>
+          <p:cNvPr id="1034" name="Picture 10">
+            <a:extLst>
+              <a:ext uri="{FF2B5EF4-FFF2-40B4-BE49-F238E27FC236}">
+                <a16:creationId xmlns:a16="http://schemas.microsoft.com/office/drawing/2014/main" id="{20A0125A-2145-B3DA-E35B-CD08B2D91267}"/>
+              </a:ext>
+            </a:extLst>
+          </p:cNvPr>
+          <p:cNvPicPr>
+            <a:picLocks noChangeAspect="1" noChangeArrowheads="1"/>
+          </p:cNvPicPr>
+          <p:nvPr/>
+        </p:nvPicPr>
+        <p:blipFill>
+          <a:blip r:embed="rId3">
+            <a:extLst>
+              <a:ext uri="{28A0092B-C50C-407E-A947-70E740481C1C}">
+                <a14:useLocalDpi xmlns:a14="http://schemas.microsoft.com/office/drawing/2010/main" val="0"/>
+              </a:ext>
+            </a:extLst>
+          </a:blip>
+          <a:srcRect/>
+          <a:stretch>
+            <a:fillRect/>
+          </a:stretch>
+        </p:blipFill>
+        <p:spPr bwMode="auto">
+          <a:xfrm>
+            <a:off x="7469984" y="6658588"/>
+            <a:ext cx="4892948" cy="3775989"/>
+          </a:xfrm>
+          <a:prstGeom prst="rect">
+            <a:avLst/>
+          </a:prstGeom>
+          <a:noFill/>
+          <a:extLst>
+            <a:ext uri="{909E8E84-426E-40DD-AFC4-6F175D3DCCD1}">
+              <a14:hiddenFill xmlns:a14="http://schemas.microsoft.com/office/drawing/2010/main">
+                <a:solidFill>
+                  <a:srgbClr val="FFFFFF"/>
+                </a:solidFill>
+              </a14:hiddenFill>
+            </a:ext>
+          </a:extLst>
+        </p:spPr>
+      </p:pic>
+      <p:pic>
+        <p:nvPicPr>
+          <p:cNvPr id="1036" name="Picture 12">
+            <a:extLst>
+              <a:ext uri="{FF2B5EF4-FFF2-40B4-BE49-F238E27FC236}">
+                <a16:creationId xmlns:a16="http://schemas.microsoft.com/office/drawing/2014/main" id="{83778A2D-2AD8-42D3-80B5-66B54165C32E}"/>
+              </a:ext>
+            </a:extLst>
+          </p:cNvPr>
+          <p:cNvPicPr>
+            <a:picLocks noChangeAspect="1" noChangeArrowheads="1"/>
+          </p:cNvPicPr>
+          <p:nvPr/>
+        </p:nvPicPr>
+        <p:blipFill>
+          <a:blip r:embed="rId4">
+            <a:extLst>
+              <a:ext uri="{28A0092B-C50C-407E-A947-70E740481C1C}">
+                <a14:useLocalDpi xmlns:a14="http://schemas.microsoft.com/office/drawing/2010/main" val="0"/>
+              </a:ext>
+            </a:extLst>
+          </a:blip>
+          <a:srcRect/>
+          <a:stretch>
+            <a:fillRect/>
+          </a:stretch>
+        </p:blipFill>
+        <p:spPr bwMode="auto">
+          <a:xfrm>
+            <a:off x="2116527" y="6658588"/>
+            <a:ext cx="4892949" cy="3861509"/>
+          </a:xfrm>
+          <a:prstGeom prst="rect">
+            <a:avLst/>
+          </a:prstGeom>
+          <a:noFill/>
+          <a:extLst>
+            <a:ext uri="{909E8E84-426E-40DD-AFC4-6F175D3DCCD1}">
+              <a14:hiddenFill xmlns:a14="http://schemas.microsoft.com/office/drawing/2010/main">
+                <a:solidFill>
+                  <a:srgbClr val="FFFFFF"/>
+                </a:solidFill>
+              </a14:hiddenFill>
+            </a:ext>
+          </a:extLst>
+        </p:spPr>
+      </p:pic>
     </p:spTree>
     <p:extLst>
       <p:ext uri="{BB962C8B-B14F-4D97-AF65-F5344CB8AC3E}">
@@ -9228,6 +10767,13 @@
               <a:srgbClr val="5271FF"/>
             </a:solidFill>
           </p:spPr>
+          <p:txBody>
+            <a:bodyPr/>
+            <a:lstStyle/>
+            <a:p>
+              <a:endParaRPr lang="es-ES"/>
+            </a:p>
+          </p:txBody>
         </p:sp>
       </p:grpSp>
       <p:grpSp>
@@ -9314,6 +10860,13 @@
               <a:srgbClr val="FFFFFF"/>
             </a:solidFill>
           </p:spPr>
+          <p:txBody>
+            <a:bodyPr/>
+            <a:lstStyle/>
+            <a:p>
+              <a:endParaRPr lang="es-ES"/>
+            </a:p>
+          </p:txBody>
         </p:sp>
       </p:grpSp>
       <p:grpSp>
@@ -9381,6 +10934,13 @@
               <a:srgbClr val="5271FF"/>
             </a:solidFill>
           </p:spPr>
+          <p:txBody>
+            <a:bodyPr/>
+            <a:lstStyle/>
+            <a:p>
+              <a:endParaRPr lang="es-ES"/>
+            </a:p>
+          </p:txBody>
         </p:sp>
       </p:grpSp>
       <p:grpSp>
@@ -9467,6 +11027,13 @@
               <a:srgbClr val="FFFFFF"/>
             </a:solidFill>
           </p:spPr>
+          <p:txBody>
+            <a:bodyPr/>
+            <a:lstStyle/>
+            <a:p>
+              <a:endParaRPr lang="es-ES"/>
+            </a:p>
+          </p:txBody>
         </p:sp>
       </p:grpSp>
       <p:grpSp>
@@ -9534,6 +11101,13 @@
               <a:srgbClr val="5271FF"/>
             </a:solidFill>
           </p:spPr>
+          <p:txBody>
+            <a:bodyPr/>
+            <a:lstStyle/>
+            <a:p>
+              <a:endParaRPr lang="es-ES"/>
+            </a:p>
+          </p:txBody>
         </p:sp>
       </p:grpSp>
       <p:grpSp>
@@ -9620,6 +11194,13 @@
               <a:srgbClr val="FFFFFF"/>
             </a:solidFill>
           </p:spPr>
+          <p:txBody>
+            <a:bodyPr/>
+            <a:lstStyle/>
+            <a:p>
+              <a:endParaRPr lang="es-ES"/>
+            </a:p>
+          </p:txBody>
         </p:sp>
       </p:grpSp>
       <p:sp>
@@ -9730,8 +11311,8 @@
         </p:nvSpPr>
         <p:spPr>
           <a:xfrm>
-            <a:off x="3581400" y="2553575"/>
-            <a:ext cx="14097000" cy="2585323"/>
+            <a:off x="9829800" y="2742843"/>
+            <a:ext cx="8001000" cy="5355312"/>
           </a:xfrm>
           <a:prstGeom prst="rect">
             <a:avLst/>
@@ -9771,14 +11352,149 @@
             </a:endParaRPr>
           </a:p>
           <a:p>
+            <a:r>
+              <a:rPr lang="es-ES" sz="3600" dirty="0">
+                <a:latin typeface="Lato Italics" panose="020B0604020202020204" charset="0"/>
+                <a:ea typeface="Lato Italics" panose="020B0604020202020204" charset="0"/>
+                <a:cs typeface="Lato Italics" panose="020B0604020202020204" charset="0"/>
+              </a:rPr>
+              <a:t>Correlaciones significativas: </a:t>
+            </a:r>
+            <a:r>
+              <a:rPr lang="es-ES" sz="3600" dirty="0" err="1">
+                <a:latin typeface="Lato Italics" panose="020B0604020202020204" charset="0"/>
+                <a:ea typeface="Lato Italics" panose="020B0604020202020204" charset="0"/>
+                <a:cs typeface="Lato Italics" panose="020B0604020202020204" charset="0"/>
+              </a:rPr>
+              <a:t>SpG</a:t>
+            </a:r>
+            <a:r>
+              <a:rPr lang="es-ES" sz="3600" dirty="0">
+                <a:latin typeface="Lato Italics" panose="020B0604020202020204" charset="0"/>
+                <a:ea typeface="Lato Italics" panose="020B0604020202020204" charset="0"/>
+                <a:cs typeface="Lato Italics" panose="020B0604020202020204" charset="0"/>
+              </a:rPr>
+              <a:t> x </a:t>
+            </a:r>
+            <a:r>
+              <a:rPr lang="es-ES" sz="3600" dirty="0" err="1">
+                <a:latin typeface="Lato Italics" panose="020B0604020202020204" charset="0"/>
+                <a:ea typeface="Lato Italics" panose="020B0604020202020204" charset="0"/>
+                <a:cs typeface="Lato Italics" panose="020B0604020202020204" charset="0"/>
+              </a:rPr>
+              <a:t>Goals</a:t>
+            </a:r>
+            <a:r>
+              <a:rPr lang="es-ES" sz="3600" dirty="0">
+                <a:latin typeface="Lato Italics" panose="020B0604020202020204" charset="0"/>
+                <a:ea typeface="Lato Italics" panose="020B0604020202020204" charset="0"/>
+                <a:cs typeface="Lato Italics" panose="020B0604020202020204" charset="0"/>
+              </a:rPr>
+              <a:t>, </a:t>
+            </a:r>
+            <a:r>
+              <a:rPr lang="es-ES" sz="3600" dirty="0" err="1">
+                <a:latin typeface="Lato Italics" panose="020B0604020202020204" charset="0"/>
+                <a:ea typeface="Lato Italics" panose="020B0604020202020204" charset="0"/>
+                <a:cs typeface="Lato Italics" panose="020B0604020202020204" charset="0"/>
+              </a:rPr>
+              <a:t>KeyP</a:t>
+            </a:r>
+            <a:r>
+              <a:rPr lang="es-ES" sz="3600" dirty="0">
+                <a:latin typeface="Lato Italics" panose="020B0604020202020204" charset="0"/>
+                <a:ea typeface="Lato Italics" panose="020B0604020202020204" charset="0"/>
+                <a:cs typeface="Lato Italics" panose="020B0604020202020204" charset="0"/>
+              </a:rPr>
+              <a:t> x </a:t>
+            </a:r>
+            <a:r>
+              <a:rPr lang="es-ES" sz="3600" dirty="0" err="1">
+                <a:latin typeface="Lato Italics" panose="020B0604020202020204" charset="0"/>
+                <a:ea typeface="Lato Italics" panose="020B0604020202020204" charset="0"/>
+                <a:cs typeface="Lato Italics" panose="020B0604020202020204" charset="0"/>
+              </a:rPr>
+              <a:t>Assists</a:t>
+            </a:r>
+            <a:r>
+              <a:rPr lang="es-ES" sz="3600" dirty="0">
+                <a:latin typeface="Lato Italics" panose="020B0604020202020204" charset="0"/>
+                <a:ea typeface="Lato Italics" panose="020B0604020202020204" charset="0"/>
+                <a:cs typeface="Lato Italics" panose="020B0604020202020204" charset="0"/>
+              </a:rPr>
+              <a:t>, Posiciones de equipos en diferentes años</a:t>
+            </a:r>
+          </a:p>
+          <a:p>
             <a:endParaRPr lang="es-ES" sz="3600" dirty="0">
               <a:latin typeface="Lato Italics" panose="020B0604020202020204" charset="0"/>
               <a:ea typeface="Lato Italics" panose="020B0604020202020204" charset="0"/>
               <a:cs typeface="Lato Italics" panose="020B0604020202020204" charset="0"/>
             </a:endParaRPr>
           </a:p>
+          <a:p>
+            <a:endParaRPr lang="es-ES" sz="3600" dirty="0">
+              <a:latin typeface="Lato Italics" panose="020B0604020202020204" charset="0"/>
+              <a:ea typeface="Lato Italics" panose="020B0604020202020204" charset="0"/>
+              <a:cs typeface="Lato Italics" panose="020B0604020202020204" charset="0"/>
+            </a:endParaRPr>
+          </a:p>
+          <a:p>
+            <a:endParaRPr lang="es-ES" sz="3600" dirty="0">
+              <a:latin typeface="Lato Italics" panose="020B0604020202020204" charset="0"/>
+              <a:ea typeface="Lato Italics" panose="020B0604020202020204" charset="0"/>
+              <a:cs typeface="Lato Italics" panose="020B0604020202020204" charset="0"/>
+            </a:endParaRPr>
+          </a:p>
         </p:txBody>
       </p:sp>
+      <p:pic>
+        <p:nvPicPr>
+          <p:cNvPr id="3074" name="Picture 2">
+            <a:extLst>
+              <a:ext uri="{FF2B5EF4-FFF2-40B4-BE49-F238E27FC236}">
+                <a16:creationId xmlns:a16="http://schemas.microsoft.com/office/drawing/2014/main" id="{83C15BCB-A7D6-AEB1-9A92-29289C66DD60}"/>
+              </a:ext>
+            </a:extLst>
+          </p:cNvPr>
+          <p:cNvPicPr>
+            <a:picLocks noChangeAspect="1" noChangeArrowheads="1"/>
+          </p:cNvPicPr>
+          <p:nvPr/>
+        </p:nvPicPr>
+        <p:blipFill>
+          <a:blip r:embed="rId2">
+            <a:extLst>
+              <a:ext uri="{28A0092B-C50C-407E-A947-70E740481C1C}">
+                <a14:useLocalDpi xmlns:a14="http://schemas.microsoft.com/office/drawing/2010/main" val="0"/>
+              </a:ext>
+            </a:extLst>
+          </a:blip>
+          <a:srcRect/>
+          <a:stretch>
+            <a:fillRect/>
+          </a:stretch>
+        </p:blipFill>
+        <p:spPr bwMode="auto">
+          <a:xfrm>
+            <a:off x="0" y="2240323"/>
+            <a:ext cx="9450575" cy="8031479"/>
+          </a:xfrm>
+          <a:prstGeom prst="rect">
+            <a:avLst/>
+          </a:prstGeom>
+          <a:noFill/>
+          <a:extLst>
+            <a:ext uri="{909E8E84-426E-40DD-AFC4-6F175D3DCCD1}">
+              <a14:hiddenFill xmlns:a14="http://schemas.microsoft.com/office/drawing/2010/main">
+                <a:solidFill>
+                  <a:srgbClr val="FFFFFF"/>
+                </a:solidFill>
+              </a14:hiddenFill>
+            </a:ext>
+          </a:extLst>
+        </p:spPr>
+      </p:pic>
     </p:spTree>
     <p:extLst>
       <p:ext uri="{BB962C8B-B14F-4D97-AF65-F5344CB8AC3E}">
@@ -9880,6 +11596,13 @@
               <a:srgbClr val="5271FF"/>
             </a:solidFill>
           </p:spPr>
+          <p:txBody>
+            <a:bodyPr/>
+            <a:lstStyle/>
+            <a:p>
+              <a:endParaRPr lang="es-ES"/>
+            </a:p>
+          </p:txBody>
         </p:sp>
       </p:grpSp>
       <p:grpSp>
@@ -9966,6 +11689,13 @@
               <a:srgbClr val="FFFFFF"/>
             </a:solidFill>
           </p:spPr>
+          <p:txBody>
+            <a:bodyPr/>
+            <a:lstStyle/>
+            <a:p>
+              <a:endParaRPr lang="es-ES"/>
+            </a:p>
+          </p:txBody>
         </p:sp>
       </p:grpSp>
       <p:grpSp>
@@ -10033,6 +11763,13 @@
               <a:srgbClr val="5271FF"/>
             </a:solidFill>
           </p:spPr>
+          <p:txBody>
+            <a:bodyPr/>
+            <a:lstStyle/>
+            <a:p>
+              <a:endParaRPr lang="es-ES"/>
+            </a:p>
+          </p:txBody>
         </p:sp>
       </p:grpSp>
       <p:grpSp>
@@ -10119,6 +11856,13 @@
               <a:srgbClr val="FFFFFF"/>
             </a:solidFill>
           </p:spPr>
+          <p:txBody>
+            <a:bodyPr/>
+            <a:lstStyle/>
+            <a:p>
+              <a:endParaRPr lang="es-ES"/>
+            </a:p>
+          </p:txBody>
         </p:sp>
       </p:grpSp>
       <p:grpSp>
@@ -10186,6 +11930,13 @@
               <a:srgbClr val="5271FF"/>
             </a:solidFill>
           </p:spPr>
+          <p:txBody>
+            <a:bodyPr/>
+            <a:lstStyle/>
+            <a:p>
+              <a:endParaRPr lang="es-ES"/>
+            </a:p>
+          </p:txBody>
         </p:sp>
       </p:grpSp>
       <p:grpSp>
@@ -10272,6 +12023,13 @@
               <a:srgbClr val="FFFFFF"/>
             </a:solidFill>
           </p:spPr>
+          <p:txBody>
+            <a:bodyPr/>
+            <a:lstStyle/>
+            <a:p>
+              <a:endParaRPr lang="es-ES"/>
+            </a:p>
+          </p:txBody>
         </p:sp>
       </p:grpSp>
       <p:sp>
@@ -10383,7 +12141,7 @@
         <p:spPr>
           <a:xfrm>
             <a:off x="3581400" y="2553575"/>
-            <a:ext cx="14097000" cy="2585323"/>
+            <a:ext cx="14097000" cy="8125301"/>
           </a:xfrm>
           <a:prstGeom prst="rect">
             <a:avLst/>
@@ -10405,7 +12163,90 @@
                 <a:ea typeface="Lato Italics" panose="020B0604020202020204" charset="0"/>
                 <a:cs typeface="Lato Italics" panose="020B0604020202020204" charset="0"/>
               </a:rPr>
-              <a:t>Variable Respuesta: </a:t>
+              <a:t>Variable Respuesta: Precio de mercado.</a:t>
+            </a:r>
+          </a:p>
+          <a:p>
+            <a:endParaRPr lang="es-ES" sz="3600" dirty="0">
+              <a:latin typeface="Lato Italics" panose="020B0604020202020204" charset="0"/>
+              <a:ea typeface="Lato Italics" panose="020B0604020202020204" charset="0"/>
+              <a:cs typeface="Lato Italics" panose="020B0604020202020204" charset="0"/>
+            </a:endParaRPr>
+          </a:p>
+          <a:p>
+            <a:r>
+              <a:rPr lang="es-ES" sz="3600" dirty="0">
+                <a:latin typeface="Lato Italics" panose="020B0604020202020204" charset="0"/>
+                <a:ea typeface="Lato Italics" panose="020B0604020202020204" charset="0"/>
+                <a:cs typeface="Lato Italics" panose="020B0604020202020204" charset="0"/>
+              </a:rPr>
+              <a:t>Similar a ejemplo tarjetas amarillas, hay algunos valores atípicos pero asemeja normalidad.</a:t>
+            </a:r>
+          </a:p>
+          <a:p>
+            <a:endParaRPr lang="es-ES" sz="3600" dirty="0">
+              <a:latin typeface="Lato Italics" panose="020B0604020202020204" charset="0"/>
+              <a:ea typeface="Lato Italics" panose="020B0604020202020204" charset="0"/>
+              <a:cs typeface="Lato Italics" panose="020B0604020202020204" charset="0"/>
+            </a:endParaRPr>
+          </a:p>
+          <a:p>
+            <a:r>
+              <a:rPr lang="es-ES" sz="3600" dirty="0">
+                <a:latin typeface="Lato Italics" panose="020B0604020202020204" charset="0"/>
+                <a:ea typeface="Lato Italics" panose="020B0604020202020204" charset="0"/>
+                <a:cs typeface="Lato Italics" panose="020B0604020202020204" charset="0"/>
+              </a:rPr>
+              <a:t>Correlaciones altas comprobadas con </a:t>
+            </a:r>
+            <a:r>
+              <a:rPr lang="es-ES" sz="3600" dirty="0" err="1">
+                <a:latin typeface="Lato Italics" panose="020B0604020202020204" charset="0"/>
+                <a:ea typeface="Lato Italics" panose="020B0604020202020204" charset="0"/>
+                <a:cs typeface="Lato Italics" panose="020B0604020202020204" charset="0"/>
+              </a:rPr>
+              <a:t>tests</a:t>
+            </a:r>
+            <a:r>
+              <a:rPr lang="es-ES" sz="3600" dirty="0">
+                <a:latin typeface="Lato Italics" panose="020B0604020202020204" charset="0"/>
+                <a:ea typeface="Lato Italics" panose="020B0604020202020204" charset="0"/>
+                <a:cs typeface="Lato Italics" panose="020B0604020202020204" charset="0"/>
+              </a:rPr>
+              <a:t> con: Minutos, Goles, Asistencias, Número de Tiros, Jugador del Partido, Pases Clave, </a:t>
+            </a:r>
+            <a:r>
+              <a:rPr lang="es-ES" sz="3600" dirty="0" err="1">
+                <a:latin typeface="Lato Italics" panose="020B0604020202020204" charset="0"/>
+                <a:ea typeface="Lato Italics" panose="020B0604020202020204" charset="0"/>
+                <a:cs typeface="Lato Italics" panose="020B0604020202020204" charset="0"/>
+              </a:rPr>
+              <a:t>offdrb</a:t>
+            </a:r>
+            <a:r>
+              <a:rPr lang="es-ES" sz="3600" dirty="0">
+                <a:latin typeface="Lato Italics" panose="020B0604020202020204" charset="0"/>
+                <a:ea typeface="Lato Italics" panose="020B0604020202020204" charset="0"/>
+                <a:cs typeface="Lato Italics" panose="020B0604020202020204" charset="0"/>
+              </a:rPr>
+              <a:t> o Media de Pases.</a:t>
+            </a:r>
+          </a:p>
+          <a:p>
+            <a:endParaRPr lang="es-ES" sz="3600" dirty="0">
+              <a:latin typeface="Lato Italics" panose="020B0604020202020204" charset="0"/>
+              <a:ea typeface="Lato Italics" panose="020B0604020202020204" charset="0"/>
+              <a:cs typeface="Lato Italics" panose="020B0604020202020204" charset="0"/>
+            </a:endParaRPr>
+          </a:p>
+          <a:p>
+            <a:r>
+              <a:rPr lang="es-ES" sz="3600" dirty="0">
+                <a:latin typeface="Lato Italics" panose="020B0604020202020204" charset="0"/>
+                <a:ea typeface="Lato Italics" panose="020B0604020202020204" charset="0"/>
+                <a:cs typeface="Lato Italics" panose="020B0604020202020204" charset="0"/>
+              </a:rPr>
+              <a:t>Son variables que suponíamos que serían útiles en la parte de transformación, seguramente no serán las únicas que se utilicen. </a:t>
             </a:r>
           </a:p>
           <a:p>
@@ -10676,6 +12517,13 @@
               <a:srgbClr val="5271FF"/>
             </a:solidFill>
           </p:spPr>
+          <p:txBody>
+            <a:bodyPr/>
+            <a:lstStyle/>
+            <a:p>
+              <a:endParaRPr lang="es-ES"/>
+            </a:p>
+          </p:txBody>
         </p:sp>
       </p:grpSp>
       <p:sp>
@@ -10701,6 +12549,13 @@
             <a:tailEnd type="none" w="sm" len="sm"/>
           </a:ln>
         </p:spPr>
+        <p:txBody>
+          <a:bodyPr/>
+          <a:lstStyle/>
+          <a:p>
+            <a:endParaRPr lang="es-ES"/>
+          </a:p>
+        </p:txBody>
       </p:sp>
       <p:sp>
         <p:nvSpPr>
@@ -10725,6 +12580,13 @@
             <a:tailEnd type="none" w="sm" len="sm"/>
           </a:ln>
         </p:spPr>
+        <p:txBody>
+          <a:bodyPr/>
+          <a:lstStyle/>
+          <a:p>
+            <a:endParaRPr lang="es-ES"/>
+          </a:p>
+        </p:txBody>
       </p:sp>
       <p:sp>
         <p:nvSpPr>
@@ -10793,6 +12655,13 @@
             <a:tailEnd type="none" w="sm" len="sm"/>
           </a:ln>
         </p:spPr>
+        <p:txBody>
+          <a:bodyPr/>
+          <a:lstStyle/>
+          <a:p>
+            <a:endParaRPr lang="es-ES"/>
+          </a:p>
+        </p:txBody>
       </p:sp>
       <p:sp>
         <p:nvSpPr>
@@ -10971,6 +12840,13 @@
               <a:srgbClr val="2B4A9D"/>
             </a:solidFill>
           </p:spPr>
+          <p:txBody>
+            <a:bodyPr/>
+            <a:lstStyle/>
+            <a:p>
+              <a:endParaRPr lang="es-ES"/>
+            </a:p>
+          </p:txBody>
         </p:sp>
       </p:grpSp>
       <p:grpSp>
@@ -11026,6 +12902,13 @@
               <a:srgbClr val="5271FF"/>
             </a:solidFill>
           </p:spPr>
+          <p:txBody>
+            <a:bodyPr/>
+            <a:lstStyle/>
+            <a:p>
+              <a:endParaRPr lang="es-ES"/>
+            </a:p>
+          </p:txBody>
         </p:sp>
       </p:grpSp>
       <p:grpSp>
@@ -11100,6 +12983,13 @@
               <a:srgbClr val="FFFFFF"/>
             </a:solidFill>
           </p:spPr>
+          <p:txBody>
+            <a:bodyPr/>
+            <a:lstStyle/>
+            <a:p>
+              <a:endParaRPr lang="es-ES"/>
+            </a:p>
+          </p:txBody>
         </p:sp>
       </p:grpSp>
       <p:grpSp>
@@ -11155,6 +13045,13 @@
               <a:srgbClr val="5271FF"/>
             </a:solidFill>
           </p:spPr>
+          <p:txBody>
+            <a:bodyPr/>
+            <a:lstStyle/>
+            <a:p>
+              <a:endParaRPr lang="es-ES"/>
+            </a:p>
+          </p:txBody>
         </p:sp>
       </p:grpSp>
       <p:grpSp>
@@ -11229,6 +13126,13 @@
               <a:srgbClr val="FFFFFF"/>
             </a:solidFill>
           </p:spPr>
+          <p:txBody>
+            <a:bodyPr/>
+            <a:lstStyle/>
+            <a:p>
+              <a:endParaRPr lang="es-ES"/>
+            </a:p>
+          </p:txBody>
         </p:sp>
       </p:grpSp>
       <p:grpSp>
@@ -11284,6 +13188,13 @@
               <a:srgbClr val="5271FF"/>
             </a:solidFill>
           </p:spPr>
+          <p:txBody>
+            <a:bodyPr/>
+            <a:lstStyle/>
+            <a:p>
+              <a:endParaRPr lang="es-ES"/>
+            </a:p>
+          </p:txBody>
         </p:sp>
       </p:grpSp>
       <p:grpSp>
@@ -11358,6 +13269,13 @@
               <a:srgbClr val="FFFFFF"/>
             </a:solidFill>
           </p:spPr>
+          <p:txBody>
+            <a:bodyPr/>
+            <a:lstStyle/>
+            <a:p>
+              <a:endParaRPr lang="es-ES"/>
+            </a:p>
+          </p:txBody>
         </p:sp>
       </p:grpSp>
       <p:sp>
@@ -11704,6 +13622,13 @@
               <a:srgbClr val="2B4A9D"/>
             </a:solidFill>
           </p:spPr>
+          <p:txBody>
+            <a:bodyPr/>
+            <a:lstStyle/>
+            <a:p>
+              <a:endParaRPr lang="es-ES"/>
+            </a:p>
+          </p:txBody>
         </p:sp>
       </p:grpSp>
       <p:sp>
@@ -11757,6 +13682,13 @@
             </a:stretch>
           </a:blipFill>
         </p:spPr>
+        <p:txBody>
+          <a:bodyPr/>
+          <a:lstStyle/>
+          <a:p>
+            <a:endParaRPr lang="es-ES"/>
+          </a:p>
+        </p:txBody>
       </p:sp>
     </p:spTree>
   </p:cSld>
@@ -11854,6 +13786,13 @@
               <a:srgbClr val="5271FF"/>
             </a:solidFill>
           </p:spPr>
+          <p:txBody>
+            <a:bodyPr/>
+            <a:lstStyle/>
+            <a:p>
+              <a:endParaRPr lang="es-ES"/>
+            </a:p>
+          </p:txBody>
         </p:sp>
       </p:grpSp>
       <p:grpSp>
@@ -11940,6 +13879,13 @@
               <a:srgbClr val="FFFFFF"/>
             </a:solidFill>
           </p:spPr>
+          <p:txBody>
+            <a:bodyPr/>
+            <a:lstStyle/>
+            <a:p>
+              <a:endParaRPr lang="es-ES"/>
+            </a:p>
+          </p:txBody>
         </p:sp>
       </p:grpSp>
       <p:grpSp>
@@ -12007,6 +13953,13 @@
               <a:srgbClr val="5271FF"/>
             </a:solidFill>
           </p:spPr>
+          <p:txBody>
+            <a:bodyPr/>
+            <a:lstStyle/>
+            <a:p>
+              <a:endParaRPr lang="es-ES"/>
+            </a:p>
+          </p:txBody>
         </p:sp>
       </p:grpSp>
       <p:grpSp>
@@ -12093,6 +14046,13 @@
               <a:srgbClr val="FFFFFF"/>
             </a:solidFill>
           </p:spPr>
+          <p:txBody>
+            <a:bodyPr/>
+            <a:lstStyle/>
+            <a:p>
+              <a:endParaRPr lang="es-ES"/>
+            </a:p>
+          </p:txBody>
         </p:sp>
       </p:grpSp>
       <p:grpSp>
@@ -12160,6 +14120,13 @@
               <a:srgbClr val="5271FF"/>
             </a:solidFill>
           </p:spPr>
+          <p:txBody>
+            <a:bodyPr/>
+            <a:lstStyle/>
+            <a:p>
+              <a:endParaRPr lang="es-ES"/>
+            </a:p>
+          </p:txBody>
         </p:sp>
       </p:grpSp>
       <p:grpSp>
@@ -12246,6 +14213,13 @@
               <a:srgbClr val="FFFFFF"/>
             </a:solidFill>
           </p:spPr>
+          <p:txBody>
+            <a:bodyPr/>
+            <a:lstStyle/>
+            <a:p>
+              <a:endParaRPr lang="es-ES"/>
+            </a:p>
+          </p:txBody>
         </p:sp>
       </p:grpSp>
       <p:sp>
@@ -12357,7 +14331,7 @@
         <p:spPr>
           <a:xfrm>
             <a:off x="3505200" y="2171700"/>
-            <a:ext cx="14478000" cy="2585323"/>
+            <a:ext cx="14478000" cy="8125301"/>
           </a:xfrm>
           <a:prstGeom prst="rect">
             <a:avLst/>
@@ -12376,7 +14350,154 @@
                 <a:ea typeface="Lato Italics" panose="020B0604020202020204" charset="0"/>
                 <a:cs typeface="Lato Italics" panose="020B0604020202020204" charset="0"/>
               </a:rPr>
-              <a:t>Fuente 1:</a:t>
+              <a:t>Fuente 1: </a:t>
+            </a:r>
+            <a:r>
+              <a:rPr lang="es-ES" sz="3600" dirty="0" err="1">
+                <a:latin typeface="Lato Italics" panose="020B0604020202020204" charset="0"/>
+                <a:ea typeface="Lato Italics" panose="020B0604020202020204" charset="0"/>
+                <a:cs typeface="Lato Italics" panose="020B0604020202020204" charset="0"/>
+              </a:rPr>
+              <a:t>Whoscored</a:t>
+            </a:r>
+            <a:endParaRPr lang="es-ES" sz="3600" dirty="0">
+              <a:latin typeface="Lato Italics" panose="020B0604020202020204" charset="0"/>
+              <a:ea typeface="Lato Italics" panose="020B0604020202020204" charset="0"/>
+              <a:cs typeface="Lato Italics" panose="020B0604020202020204" charset="0"/>
+            </a:endParaRPr>
+          </a:p>
+          <a:p>
+            <a:endParaRPr lang="es-ES" sz="3600" dirty="0">
+              <a:latin typeface="Lato Italics" panose="020B0604020202020204" charset="0"/>
+              <a:ea typeface="Lato Italics" panose="020B0604020202020204" charset="0"/>
+              <a:cs typeface="Lato Italics" panose="020B0604020202020204" charset="0"/>
+            </a:endParaRPr>
+          </a:p>
+          <a:p>
+            <a:r>
+              <a:rPr lang="es-ES" sz="3600" dirty="0">
+                <a:latin typeface="Lato Italics" panose="020B0604020202020204" charset="0"/>
+                <a:ea typeface="Lato Italics" panose="020B0604020202020204" charset="0"/>
+                <a:cs typeface="Lato Italics" panose="020B0604020202020204" charset="0"/>
+              </a:rPr>
+              <a:t>Información: Estadísticas de los partidos</a:t>
+            </a:r>
+          </a:p>
+          <a:p>
+            <a:endParaRPr lang="es-ES" sz="3600" dirty="0">
+              <a:latin typeface="Lato Italics" panose="020B0604020202020204" charset="0"/>
+              <a:ea typeface="Lato Italics" panose="020B0604020202020204" charset="0"/>
+              <a:cs typeface="Lato Italics" panose="020B0604020202020204" charset="0"/>
+            </a:endParaRPr>
+          </a:p>
+          <a:p>
+            <a:r>
+              <a:rPr lang="es-ES" sz="3600" dirty="0">
+                <a:latin typeface="Lato Italics" panose="020B0604020202020204" charset="0"/>
+                <a:ea typeface="Lato Italics" panose="020B0604020202020204" charset="0"/>
+                <a:cs typeface="Lato Italics" panose="020B0604020202020204" charset="0"/>
+              </a:rPr>
+              <a:t>Herramientas: Librerías Pandas, </a:t>
+            </a:r>
+            <a:r>
+              <a:rPr lang="es-ES" sz="3600" dirty="0" err="1">
+                <a:latin typeface="Lato Italics" panose="020B0604020202020204" charset="0"/>
+                <a:ea typeface="Lato Italics" panose="020B0604020202020204" charset="0"/>
+                <a:cs typeface="Lato Italics" panose="020B0604020202020204" charset="0"/>
+              </a:rPr>
+              <a:t>Selenium</a:t>
+            </a:r>
+            <a:r>
+              <a:rPr lang="es-ES" sz="3600" dirty="0">
+                <a:latin typeface="Lato Italics" panose="020B0604020202020204" charset="0"/>
+                <a:ea typeface="Lato Italics" panose="020B0604020202020204" charset="0"/>
+                <a:cs typeface="Lato Italics" panose="020B0604020202020204" charset="0"/>
+              </a:rPr>
+              <a:t> y Time</a:t>
+            </a:r>
+          </a:p>
+          <a:p>
+            <a:endParaRPr lang="es-ES" sz="3600" dirty="0">
+              <a:latin typeface="Lato Italics" panose="020B0604020202020204" charset="0"/>
+              <a:ea typeface="Lato Italics" panose="020B0604020202020204" charset="0"/>
+              <a:cs typeface="Lato Italics" panose="020B0604020202020204" charset="0"/>
+            </a:endParaRPr>
+          </a:p>
+          <a:p>
+            <a:r>
+              <a:rPr lang="es-ES" sz="3600" dirty="0">
+                <a:latin typeface="Lato Italics" panose="020B0604020202020204" charset="0"/>
+                <a:ea typeface="Lato Italics" panose="020B0604020202020204" charset="0"/>
+                <a:cs typeface="Lato Italics" panose="020B0604020202020204" charset="0"/>
+              </a:rPr>
+              <a:t>Código: Inicializar el Driver, aceptar cookies, sacar toda la información de la tabla página por página.</a:t>
+            </a:r>
+          </a:p>
+          <a:p>
+            <a:endParaRPr lang="es-ES" sz="3600" dirty="0">
+              <a:latin typeface="Lato Italics" panose="020B0604020202020204" charset="0"/>
+              <a:ea typeface="Lato Italics" panose="020B0604020202020204" charset="0"/>
+              <a:cs typeface="Lato Italics" panose="020B0604020202020204" charset="0"/>
+            </a:endParaRPr>
+          </a:p>
+          <a:p>
+            <a:r>
+              <a:rPr lang="es-ES" sz="3600" dirty="0">
+                <a:latin typeface="Lato Italics" panose="020B0604020202020204" charset="0"/>
+                <a:ea typeface="Lato Italics" panose="020B0604020202020204" charset="0"/>
+                <a:cs typeface="Lato Italics" panose="020B0604020202020204" charset="0"/>
+              </a:rPr>
+              <a:t>Información de 5 temporadas de diferentes aspectos:</a:t>
+            </a:r>
+          </a:p>
+          <a:p>
+            <a:r>
+              <a:rPr lang="es-ES" sz="3600" dirty="0" err="1">
+                <a:latin typeface="Lato Italics" panose="020B0604020202020204" charset="0"/>
+                <a:ea typeface="Lato Italics" panose="020B0604020202020204" charset="0"/>
+                <a:cs typeface="Lato Italics" panose="020B0604020202020204" charset="0"/>
+              </a:rPr>
+              <a:t>Summary</a:t>
+            </a:r>
+            <a:r>
+              <a:rPr lang="es-ES" sz="3600" dirty="0">
+                <a:latin typeface="Lato Italics" panose="020B0604020202020204" charset="0"/>
+                <a:ea typeface="Lato Italics" panose="020B0604020202020204" charset="0"/>
+                <a:cs typeface="Lato Italics" panose="020B0604020202020204" charset="0"/>
+              </a:rPr>
+              <a:t> (Generales), </a:t>
+            </a:r>
+            <a:r>
+              <a:rPr lang="es-ES" sz="3600" dirty="0" err="1">
+                <a:latin typeface="Lato Italics" panose="020B0604020202020204" charset="0"/>
+                <a:ea typeface="Lato Italics" panose="020B0604020202020204" charset="0"/>
+                <a:cs typeface="Lato Italics" panose="020B0604020202020204" charset="0"/>
+              </a:rPr>
+              <a:t>Deffensive</a:t>
+            </a:r>
+            <a:r>
+              <a:rPr lang="es-ES" sz="3600" dirty="0">
+                <a:latin typeface="Lato Italics" panose="020B0604020202020204" charset="0"/>
+                <a:ea typeface="Lato Italics" panose="020B0604020202020204" charset="0"/>
+                <a:cs typeface="Lato Italics" panose="020B0604020202020204" charset="0"/>
+              </a:rPr>
+              <a:t>, </a:t>
+            </a:r>
+            <a:r>
+              <a:rPr lang="es-ES" sz="3600" dirty="0" err="1">
+                <a:latin typeface="Lato Italics" panose="020B0604020202020204" charset="0"/>
+                <a:ea typeface="Lato Italics" panose="020B0604020202020204" charset="0"/>
+                <a:cs typeface="Lato Italics" panose="020B0604020202020204" charset="0"/>
+              </a:rPr>
+              <a:t>Offensive</a:t>
+            </a:r>
+            <a:r>
+              <a:rPr lang="es-ES" sz="3600" dirty="0">
+                <a:latin typeface="Lato Italics" panose="020B0604020202020204" charset="0"/>
+                <a:ea typeface="Lato Italics" panose="020B0604020202020204" charset="0"/>
+                <a:cs typeface="Lato Italics" panose="020B0604020202020204" charset="0"/>
+              </a:rPr>
+              <a:t>, Passing.</a:t>
             </a:r>
           </a:p>
           <a:p>
@@ -12506,6 +14627,13 @@
               <a:srgbClr val="5271FF"/>
             </a:solidFill>
           </p:spPr>
+          <p:txBody>
+            <a:bodyPr/>
+            <a:lstStyle/>
+            <a:p>
+              <a:endParaRPr lang="es-ES"/>
+            </a:p>
+          </p:txBody>
         </p:sp>
       </p:grpSp>
       <p:grpSp>
@@ -12592,6 +14720,13 @@
               <a:srgbClr val="FFFFFF"/>
             </a:solidFill>
           </p:spPr>
+          <p:txBody>
+            <a:bodyPr/>
+            <a:lstStyle/>
+            <a:p>
+              <a:endParaRPr lang="es-ES"/>
+            </a:p>
+          </p:txBody>
         </p:sp>
       </p:grpSp>
       <p:grpSp>
@@ -12659,6 +14794,13 @@
               <a:srgbClr val="5271FF"/>
             </a:solidFill>
           </p:spPr>
+          <p:txBody>
+            <a:bodyPr/>
+            <a:lstStyle/>
+            <a:p>
+              <a:endParaRPr lang="es-ES"/>
+            </a:p>
+          </p:txBody>
         </p:sp>
       </p:grpSp>
       <p:grpSp>
@@ -12745,6 +14887,13 @@
               <a:srgbClr val="FFFFFF"/>
             </a:solidFill>
           </p:spPr>
+          <p:txBody>
+            <a:bodyPr/>
+            <a:lstStyle/>
+            <a:p>
+              <a:endParaRPr lang="es-ES"/>
+            </a:p>
+          </p:txBody>
         </p:sp>
       </p:grpSp>
       <p:grpSp>
@@ -12812,6 +14961,13 @@
               <a:srgbClr val="5271FF"/>
             </a:solidFill>
           </p:spPr>
+          <p:txBody>
+            <a:bodyPr/>
+            <a:lstStyle/>
+            <a:p>
+              <a:endParaRPr lang="es-ES"/>
+            </a:p>
+          </p:txBody>
         </p:sp>
       </p:grpSp>
       <p:grpSp>
@@ -12898,6 +15054,13 @@
               <a:srgbClr val="FFFFFF"/>
             </a:solidFill>
           </p:spPr>
+          <p:txBody>
+            <a:bodyPr/>
+            <a:lstStyle/>
+            <a:p>
+              <a:endParaRPr lang="es-ES"/>
+            </a:p>
+          </p:txBody>
         </p:sp>
       </p:grpSp>
       <p:sp>
@@ -13009,7 +15172,7 @@
         <p:spPr>
           <a:xfrm>
             <a:off x="3505200" y="2171700"/>
-            <a:ext cx="14478000" cy="2585323"/>
+            <a:ext cx="14478000" cy="7571303"/>
           </a:xfrm>
           <a:prstGeom prst="rect">
             <a:avLst/>
@@ -13028,7 +15191,101 @@
                 <a:ea typeface="Lato Italics" panose="020B0604020202020204" charset="0"/>
                 <a:cs typeface="Lato Italics" panose="020B0604020202020204" charset="0"/>
               </a:rPr>
-              <a:t>Fuente 2:</a:t>
+              <a:t>Fuente 2: </a:t>
+            </a:r>
+            <a:r>
+              <a:rPr lang="es-ES" sz="3600" dirty="0" err="1">
+                <a:latin typeface="Lato Italics" panose="020B0604020202020204" charset="0"/>
+                <a:ea typeface="Lato Italics" panose="020B0604020202020204" charset="0"/>
+                <a:cs typeface="Lato Italics" panose="020B0604020202020204" charset="0"/>
+              </a:rPr>
+              <a:t>Transfermarket</a:t>
+            </a:r>
+            <a:endParaRPr lang="es-ES" sz="3600" dirty="0">
+              <a:latin typeface="Lato Italics" panose="020B0604020202020204" charset="0"/>
+              <a:ea typeface="Lato Italics" panose="020B0604020202020204" charset="0"/>
+              <a:cs typeface="Lato Italics" panose="020B0604020202020204" charset="0"/>
+            </a:endParaRPr>
+          </a:p>
+          <a:p>
+            <a:endParaRPr lang="es-ES" sz="3600" dirty="0">
+              <a:latin typeface="Lato Italics" panose="020B0604020202020204" charset="0"/>
+              <a:ea typeface="Lato Italics" panose="020B0604020202020204" charset="0"/>
+              <a:cs typeface="Lato Italics" panose="020B0604020202020204" charset="0"/>
+            </a:endParaRPr>
+          </a:p>
+          <a:p>
+            <a:r>
+              <a:rPr lang="es-ES" sz="3600" dirty="0">
+                <a:latin typeface="Lato Italics" panose="020B0604020202020204" charset="0"/>
+                <a:ea typeface="Lato Italics" panose="020B0604020202020204" charset="0"/>
+                <a:cs typeface="Lato Italics" panose="020B0604020202020204" charset="0"/>
+              </a:rPr>
+              <a:t>Información: Datos personales y estadísticas subjetivas.</a:t>
+            </a:r>
+          </a:p>
+          <a:p>
+            <a:endParaRPr lang="es-ES" sz="3600" dirty="0">
+              <a:latin typeface="Lato Italics" panose="020B0604020202020204" charset="0"/>
+              <a:ea typeface="Lato Italics" panose="020B0604020202020204" charset="0"/>
+              <a:cs typeface="Lato Italics" panose="020B0604020202020204" charset="0"/>
+            </a:endParaRPr>
+          </a:p>
+          <a:p>
+            <a:r>
+              <a:rPr lang="es-ES" sz="3600" dirty="0">
+                <a:latin typeface="Lato Italics" panose="020B0604020202020204" charset="0"/>
+                <a:ea typeface="Lato Italics" panose="020B0604020202020204" charset="0"/>
+                <a:cs typeface="Lato Italics" panose="020B0604020202020204" charset="0"/>
+              </a:rPr>
+              <a:t>Herramientas: API de </a:t>
+            </a:r>
+            <a:r>
+              <a:rPr lang="es-ES" sz="3600" dirty="0" err="1">
+                <a:latin typeface="Lato Italics" panose="020B0604020202020204" charset="0"/>
+                <a:ea typeface="Lato Italics" panose="020B0604020202020204" charset="0"/>
+                <a:cs typeface="Lato Italics" panose="020B0604020202020204" charset="0"/>
+              </a:rPr>
+              <a:t>Transfermarket</a:t>
+            </a:r>
+            <a:endParaRPr lang="es-ES" sz="3600" dirty="0">
+              <a:latin typeface="Lato Italics" panose="020B0604020202020204" charset="0"/>
+              <a:ea typeface="Lato Italics" panose="020B0604020202020204" charset="0"/>
+              <a:cs typeface="Lato Italics" panose="020B0604020202020204" charset="0"/>
+            </a:endParaRPr>
+          </a:p>
+          <a:p>
+            <a:endParaRPr lang="es-ES" sz="3600" dirty="0">
+              <a:latin typeface="Lato Italics" panose="020B0604020202020204" charset="0"/>
+              <a:ea typeface="Lato Italics" panose="020B0604020202020204" charset="0"/>
+              <a:cs typeface="Lato Italics" panose="020B0604020202020204" charset="0"/>
+            </a:endParaRPr>
+          </a:p>
+          <a:p>
+            <a:r>
+              <a:rPr lang="es-ES" sz="3600" dirty="0">
+                <a:latin typeface="Lato Italics" panose="020B0604020202020204" charset="0"/>
+                <a:ea typeface="Lato Italics" panose="020B0604020202020204" charset="0"/>
+                <a:cs typeface="Lato Italics" panose="020B0604020202020204" charset="0"/>
+              </a:rPr>
+              <a:t>Código: La API facilita la obtención de información. </a:t>
+            </a:r>
+          </a:p>
+          <a:p>
+            <a:endParaRPr lang="es-ES" sz="3600" dirty="0">
+              <a:latin typeface="Lato Italics" panose="020B0604020202020204" charset="0"/>
+              <a:ea typeface="Lato Italics" panose="020B0604020202020204" charset="0"/>
+              <a:cs typeface="Lato Italics" panose="020B0604020202020204" charset="0"/>
+            </a:endParaRPr>
+          </a:p>
+          <a:p>
+            <a:r>
+              <a:rPr lang="es-ES" sz="3600" dirty="0">
+                <a:latin typeface="Lato Italics" panose="020B0604020202020204" charset="0"/>
+                <a:ea typeface="Lato Italics" panose="020B0604020202020204" charset="0"/>
+                <a:cs typeface="Lato Italics" panose="020B0604020202020204" charset="0"/>
+              </a:rPr>
+              <a:t>Información de cada año según el club: se toma toda la información de los jugadores a través de su equipo.</a:t>
             </a:r>
           </a:p>
           <a:p>
@@ -13140,6 +15397,13 @@
               <a:srgbClr val="2B4A9D"/>
             </a:solidFill>
           </p:spPr>
+          <p:txBody>
+            <a:bodyPr/>
+            <a:lstStyle/>
+            <a:p>
+              <a:endParaRPr lang="es-ES"/>
+            </a:p>
+          </p:txBody>
         </p:sp>
       </p:grpSp>
       <p:grpSp>
@@ -13195,6 +15459,13 @@
               <a:srgbClr val="5271FF"/>
             </a:solidFill>
           </p:spPr>
+          <p:txBody>
+            <a:bodyPr/>
+            <a:lstStyle/>
+            <a:p>
+              <a:endParaRPr lang="es-ES"/>
+            </a:p>
+          </p:txBody>
         </p:sp>
       </p:grpSp>
       <p:grpSp>
@@ -13269,6 +15540,13 @@
               <a:srgbClr val="FFFFFF"/>
             </a:solidFill>
           </p:spPr>
+          <p:txBody>
+            <a:bodyPr/>
+            <a:lstStyle/>
+            <a:p>
+              <a:endParaRPr lang="es-ES"/>
+            </a:p>
+          </p:txBody>
         </p:sp>
       </p:grpSp>
       <p:grpSp>
@@ -13324,6 +15602,13 @@
               <a:srgbClr val="5271FF"/>
             </a:solidFill>
           </p:spPr>
+          <p:txBody>
+            <a:bodyPr/>
+            <a:lstStyle/>
+            <a:p>
+              <a:endParaRPr lang="es-ES"/>
+            </a:p>
+          </p:txBody>
         </p:sp>
       </p:grpSp>
       <p:grpSp>
@@ -13398,6 +15683,13 @@
               <a:srgbClr val="FFFFFF"/>
             </a:solidFill>
           </p:spPr>
+          <p:txBody>
+            <a:bodyPr/>
+            <a:lstStyle/>
+            <a:p>
+              <a:endParaRPr lang="es-ES"/>
+            </a:p>
+          </p:txBody>
         </p:sp>
       </p:grpSp>
       <p:grpSp>
@@ -13453,6 +15745,13 @@
               <a:srgbClr val="5271FF"/>
             </a:solidFill>
           </p:spPr>
+          <p:txBody>
+            <a:bodyPr/>
+            <a:lstStyle/>
+            <a:p>
+              <a:endParaRPr lang="es-ES"/>
+            </a:p>
+          </p:txBody>
         </p:sp>
       </p:grpSp>
       <p:grpSp>
@@ -13527,6 +15826,13 @@
               <a:srgbClr val="FFFFFF"/>
             </a:solidFill>
           </p:spPr>
+          <p:txBody>
+            <a:bodyPr/>
+            <a:lstStyle/>
+            <a:p>
+              <a:endParaRPr lang="es-ES"/>
+            </a:p>
+          </p:txBody>
         </p:sp>
       </p:grpSp>
       <p:sp>
@@ -13801,6 +16107,13 @@
               <a:srgbClr val="2B4A9D"/>
             </a:solidFill>
           </p:spPr>
+          <p:txBody>
+            <a:bodyPr/>
+            <a:lstStyle/>
+            <a:p>
+              <a:endParaRPr lang="es-ES"/>
+            </a:p>
+          </p:txBody>
         </p:sp>
       </p:grpSp>
       <p:sp>
@@ -13958,6 +16271,13 @@
               <a:srgbClr val="5271FF"/>
             </a:solidFill>
           </p:spPr>
+          <p:txBody>
+            <a:bodyPr/>
+            <a:lstStyle/>
+            <a:p>
+              <a:endParaRPr lang="es-ES"/>
+            </a:p>
+          </p:txBody>
         </p:sp>
       </p:grpSp>
       <p:grpSp>
@@ -14044,6 +16364,13 @@
               <a:srgbClr val="FFFFFF"/>
             </a:solidFill>
           </p:spPr>
+          <p:txBody>
+            <a:bodyPr/>
+            <a:lstStyle/>
+            <a:p>
+              <a:endParaRPr lang="es-ES"/>
+            </a:p>
+          </p:txBody>
         </p:sp>
       </p:grpSp>
       <p:grpSp>
@@ -14111,6 +16438,13 @@
               <a:srgbClr val="5271FF"/>
             </a:solidFill>
           </p:spPr>
+          <p:txBody>
+            <a:bodyPr/>
+            <a:lstStyle/>
+            <a:p>
+              <a:endParaRPr lang="es-ES"/>
+            </a:p>
+          </p:txBody>
         </p:sp>
       </p:grpSp>
       <p:grpSp>
@@ -14197,6 +16531,13 @@
               <a:srgbClr val="FFFFFF"/>
             </a:solidFill>
           </p:spPr>
+          <p:txBody>
+            <a:bodyPr/>
+            <a:lstStyle/>
+            <a:p>
+              <a:endParaRPr lang="es-ES"/>
+            </a:p>
+          </p:txBody>
         </p:sp>
       </p:grpSp>
       <p:grpSp>
@@ -14264,6 +16605,13 @@
               <a:srgbClr val="5271FF"/>
             </a:solidFill>
           </p:spPr>
+          <p:txBody>
+            <a:bodyPr/>
+            <a:lstStyle/>
+            <a:p>
+              <a:endParaRPr lang="es-ES"/>
+            </a:p>
+          </p:txBody>
         </p:sp>
       </p:grpSp>
       <p:grpSp>
@@ -14350,6 +16698,13 @@
               <a:srgbClr val="FFFFFF"/>
             </a:solidFill>
           </p:spPr>
+          <p:txBody>
+            <a:bodyPr/>
+            <a:lstStyle/>
+            <a:p>
+              <a:endParaRPr lang="es-ES"/>
+            </a:p>
+          </p:txBody>
         </p:sp>
       </p:grpSp>
       <p:sp>
@@ -14461,7 +16816,7 @@
         <p:spPr>
           <a:xfrm>
             <a:off x="4138612" y="2095500"/>
-            <a:ext cx="13692188" cy="3477875"/>
+            <a:ext cx="13692188" cy="6278642"/>
           </a:xfrm>
           <a:prstGeom prst="rect">
             <a:avLst/>
@@ -14480,23 +16835,198 @@
                 <a:ea typeface="Lato Italics" panose="020B0604020202020204" charset="0"/>
                 <a:cs typeface="Lato Italics" panose="020B0604020202020204" charset="0"/>
               </a:rPr>
-              <a:t>Variables I:</a:t>
-            </a:r>
-          </a:p>
-          <a:p>
-            <a:endParaRPr lang="es-ES" dirty="0"/>
-          </a:p>
-          <a:p>
-            <a:endParaRPr lang="es-ES" dirty="0"/>
-          </a:p>
-          <a:p>
-            <a:endParaRPr lang="es-ES" dirty="0"/>
-          </a:p>
-          <a:p>
-            <a:endParaRPr lang="es-ES" dirty="0"/>
-          </a:p>
-          <a:p>
-            <a:endParaRPr lang="es-ES" dirty="0"/>
+              <a:t>Variables I: Números, tasas y porcentajes. Las clasificamos según su utilidad</a:t>
+            </a:r>
+          </a:p>
+          <a:p>
+            <a:endParaRPr lang="es-ES" b="1" u="sng" dirty="0"/>
+          </a:p>
+          <a:p>
+            <a:r>
+              <a:rPr lang="es-ES" sz="2400" b="1" u="sng" dirty="0"/>
+              <a:t>Útiles: </a:t>
+            </a:r>
+            <a:r>
+              <a:rPr lang="es-ES" sz="2400" b="1" dirty="0"/>
+              <a:t>Apps, </a:t>
+            </a:r>
+            <a:r>
+              <a:rPr lang="es-ES" sz="2400" b="1" dirty="0" err="1"/>
+              <a:t>Goals</a:t>
+            </a:r>
+            <a:r>
+              <a:rPr lang="es-ES" sz="2400" b="1" dirty="0"/>
+              <a:t>, </a:t>
+            </a:r>
+            <a:r>
+              <a:rPr lang="es-ES" sz="2400" b="1" dirty="0" err="1"/>
+              <a:t>Assists</a:t>
+            </a:r>
+            <a:r>
+              <a:rPr lang="es-ES" sz="2400" b="1" dirty="0"/>
+              <a:t>, </a:t>
+            </a:r>
+            <a:r>
+              <a:rPr lang="es-ES" sz="2400" b="1" dirty="0" err="1"/>
+              <a:t>SpG</a:t>
+            </a:r>
+            <a:r>
+              <a:rPr lang="es-ES" sz="2400" b="1" dirty="0"/>
+              <a:t>, </a:t>
+            </a:r>
+            <a:r>
+              <a:rPr lang="es-ES" sz="2400" b="1" dirty="0" err="1"/>
+              <a:t>MotM</a:t>
+            </a:r>
+            <a:r>
+              <a:rPr lang="es-ES" sz="2400" b="1" dirty="0"/>
+              <a:t>, </a:t>
+            </a:r>
+            <a:r>
+              <a:rPr lang="es-ES" sz="2400" b="1" dirty="0" err="1"/>
+              <a:t>Tackles</a:t>
+            </a:r>
+            <a:r>
+              <a:rPr lang="es-ES" sz="2400" b="1" dirty="0"/>
+              <a:t>, Inter, Clear, </a:t>
+            </a:r>
+            <a:r>
+              <a:rPr lang="es-ES" sz="2400" b="1" dirty="0" err="1"/>
+              <a:t>Drb_defensive</a:t>
+            </a:r>
+            <a:r>
+              <a:rPr lang="es-ES" sz="2400" b="1" dirty="0"/>
+              <a:t>, Blocks, </a:t>
+            </a:r>
+            <a:r>
+              <a:rPr lang="es-ES" sz="2400" b="1" dirty="0" err="1"/>
+              <a:t>KeyP</a:t>
+            </a:r>
+            <a:r>
+              <a:rPr lang="es-ES" sz="2400" b="1" dirty="0"/>
+              <a:t>, </a:t>
+            </a:r>
+            <a:r>
+              <a:rPr lang="es-ES" sz="2400" b="1" dirty="0" err="1"/>
+              <a:t>Mins</a:t>
+            </a:r>
+            <a:endParaRPr lang="es-ES" sz="2400" b="1" dirty="0"/>
+          </a:p>
+          <a:p>
+            <a:endParaRPr lang="es-ES" sz="2400" b="1" u="sng" dirty="0"/>
+          </a:p>
+          <a:p>
+            <a:r>
+              <a:rPr lang="es-ES" sz="2400" b="1" u="sng" dirty="0"/>
+              <a:t>Tal vez útiles: </a:t>
+            </a:r>
+            <a:r>
+              <a:rPr lang="es-ES" sz="2400" b="1" dirty="0" err="1"/>
+              <a:t>Fouls</a:t>
+            </a:r>
+            <a:r>
+              <a:rPr lang="es-ES" sz="2400" b="1" dirty="0"/>
+              <a:t>, </a:t>
+            </a:r>
+            <a:r>
+              <a:rPr lang="es-ES" sz="2400" b="1" dirty="0" err="1"/>
+              <a:t>Fouled</a:t>
+            </a:r>
+            <a:r>
+              <a:rPr lang="es-ES" sz="2400" b="1" dirty="0"/>
+              <a:t>, </a:t>
+            </a:r>
+            <a:r>
+              <a:rPr lang="es-ES" sz="2400" b="1" dirty="0" err="1"/>
+              <a:t>Disp</a:t>
+            </a:r>
+            <a:r>
+              <a:rPr lang="es-ES" sz="2400" b="1" dirty="0"/>
+              <a:t>, </a:t>
+            </a:r>
+            <a:r>
+              <a:rPr lang="es-ES" sz="2400" b="1" dirty="0" err="1"/>
+              <a:t>Foot</a:t>
+            </a:r>
+            <a:r>
+              <a:rPr lang="es-ES" sz="2400" b="1" dirty="0"/>
+              <a:t>, </a:t>
+            </a:r>
+            <a:r>
+              <a:rPr lang="es-ES" sz="2400" b="1" dirty="0" err="1"/>
+              <a:t>AerialsWon</a:t>
+            </a:r>
+            <a:r>
+              <a:rPr lang="es-ES" sz="2400" b="1" dirty="0"/>
+              <a:t>, </a:t>
+            </a:r>
+            <a:r>
+              <a:rPr lang="es-ES" sz="2400" b="1" dirty="0" err="1"/>
+              <a:t>Drb_offensive</a:t>
+            </a:r>
+            <a:endParaRPr lang="es-ES" sz="2400" b="1" u="sng" dirty="0"/>
+          </a:p>
+          <a:p>
+            <a:endParaRPr lang="es-ES" sz="2400" dirty="0"/>
+          </a:p>
+          <a:p>
+            <a:r>
+              <a:rPr lang="es-ES" sz="2400" b="1" u="sng" dirty="0"/>
+              <a:t>No útiles: </a:t>
+            </a:r>
+            <a:r>
+              <a:rPr lang="es-ES" sz="2400" b="1" dirty="0" err="1"/>
+              <a:t>Yel</a:t>
+            </a:r>
+            <a:r>
+              <a:rPr lang="es-ES" sz="2400" b="1" dirty="0"/>
+              <a:t>, Red, </a:t>
+            </a:r>
+            <a:r>
+              <a:rPr lang="es-ES" sz="2400" b="1" dirty="0" err="1"/>
+              <a:t>Offsides_won</a:t>
+            </a:r>
+            <a:r>
+              <a:rPr lang="es-ES" sz="2400" b="1" dirty="0"/>
+              <a:t>, </a:t>
+            </a:r>
+            <a:r>
+              <a:rPr lang="es-ES" sz="2400" b="1" dirty="0" err="1"/>
+              <a:t>OwnG</a:t>
+            </a:r>
+            <a:r>
+              <a:rPr lang="es-ES" sz="2400" b="1" dirty="0"/>
+              <a:t>, </a:t>
+            </a:r>
+            <a:r>
+              <a:rPr lang="es-ES" sz="2400" b="1" dirty="0" err="1"/>
+              <a:t>Offsides</a:t>
+            </a:r>
+            <a:r>
+              <a:rPr lang="es-ES" sz="2400" b="1" dirty="0"/>
+              <a:t>, </a:t>
+            </a:r>
+            <a:r>
+              <a:rPr lang="es-ES" sz="2400" b="1" dirty="0" err="1"/>
+              <a:t>UnsTch</a:t>
+            </a:r>
+            <a:r>
+              <a:rPr lang="es-ES" sz="2400" b="1" dirty="0"/>
+              <a:t>, </a:t>
+            </a:r>
+            <a:r>
+              <a:rPr lang="es-ES" sz="2400" b="1" dirty="0" err="1"/>
+              <a:t>AvgP</a:t>
+            </a:r>
+            <a:r>
+              <a:rPr lang="es-ES" sz="2400" b="1" dirty="0"/>
+              <a:t>, </a:t>
+            </a:r>
+            <a:r>
+              <a:rPr lang="es-ES" sz="2400" b="1" dirty="0" err="1"/>
+              <a:t>Crosses</a:t>
+            </a:r>
+            <a:endParaRPr lang="es-ES" sz="2400" b="1" u="sng" dirty="0"/>
           </a:p>
           <a:p>
             <a:endParaRPr lang="es-ES" dirty="0"/>
@@ -14508,11 +17038,39 @@
                 <a:ea typeface="Lato Italics" panose="020B0604020202020204" charset="0"/>
                 <a:cs typeface="Lato Italics" panose="020B0604020202020204" charset="0"/>
               </a:rPr>
-              <a:t>Variables II:</a:t>
-            </a:r>
-          </a:p>
-          <a:p>
-            <a:endParaRPr lang="es-ES" dirty="0"/>
+              <a:t>Variables II: Tenemos tres variables imprescindibles: Position, Age y </a:t>
+            </a:r>
+            <a:r>
+              <a:rPr lang="es-ES" sz="3600" dirty="0" err="1">
+                <a:latin typeface="Lato Italics" panose="020B0604020202020204" charset="0"/>
+                <a:ea typeface="Lato Italics" panose="020B0604020202020204" charset="0"/>
+                <a:cs typeface="Lato Italics" panose="020B0604020202020204" charset="0"/>
+              </a:rPr>
+              <a:t>MarketValue</a:t>
+            </a:r>
+            <a:endParaRPr lang="es-ES" sz="3600" dirty="0">
+              <a:latin typeface="Lato Italics" panose="020B0604020202020204" charset="0"/>
+              <a:ea typeface="Lato Italics" panose="020B0604020202020204" charset="0"/>
+              <a:cs typeface="Lato Italics" panose="020B0604020202020204" charset="0"/>
+            </a:endParaRPr>
+          </a:p>
+          <a:p>
+            <a:endParaRPr lang="es-ES" sz="3600" dirty="0">
+              <a:latin typeface="Lato Italics" panose="020B0604020202020204" charset="0"/>
+              <a:ea typeface="Lato Italics" panose="020B0604020202020204" charset="0"/>
+              <a:cs typeface="Lato Italics" panose="020B0604020202020204" charset="0"/>
+            </a:endParaRPr>
+          </a:p>
+          <a:p>
+            <a:r>
+              <a:rPr lang="es-ES" sz="2400" b="1" u="sng" dirty="0"/>
+              <a:t>Transformaciones: </a:t>
+            </a:r>
+            <a:r>
+              <a:rPr lang="es-ES" sz="2400" b="1" dirty="0"/>
+              <a:t>Juntamos el equipo del jugador (cualitativa) con su posición en esa temporada para obtener más variables.</a:t>
+            </a:r>
+            <a:endParaRPr lang="es-ES" sz="2400" b="1" u="sng" dirty="0"/>
           </a:p>
           <a:p>
             <a:endParaRPr lang="es-ES" dirty="0"/>
@@ -14620,6 +17178,13 @@
               <a:srgbClr val="5271FF"/>
             </a:solidFill>
           </p:spPr>
+          <p:txBody>
+            <a:bodyPr/>
+            <a:lstStyle/>
+            <a:p>
+              <a:endParaRPr lang="es-ES"/>
+            </a:p>
+          </p:txBody>
         </p:sp>
       </p:grpSp>
       <p:grpSp>
@@ -14706,6 +17271,13 @@
               <a:srgbClr val="FFFFFF"/>
             </a:solidFill>
           </p:spPr>
+          <p:txBody>
+            <a:bodyPr/>
+            <a:lstStyle/>
+            <a:p>
+              <a:endParaRPr lang="es-ES"/>
+            </a:p>
+          </p:txBody>
         </p:sp>
       </p:grpSp>
       <p:grpSp>
@@ -14773,6 +17345,13 @@
               <a:srgbClr val="5271FF"/>
             </a:solidFill>
           </p:spPr>
+          <p:txBody>
+            <a:bodyPr/>
+            <a:lstStyle/>
+            <a:p>
+              <a:endParaRPr lang="es-ES"/>
+            </a:p>
+          </p:txBody>
         </p:sp>
       </p:grpSp>
       <p:grpSp>
@@ -14859,6 +17438,13 @@
               <a:srgbClr val="FFFFFF"/>
             </a:solidFill>
           </p:spPr>
+          <p:txBody>
+            <a:bodyPr/>
+            <a:lstStyle/>
+            <a:p>
+              <a:endParaRPr lang="es-ES"/>
+            </a:p>
+          </p:txBody>
         </p:sp>
       </p:grpSp>
       <p:grpSp>
@@ -14926,6 +17512,13 @@
               <a:srgbClr val="5271FF"/>
             </a:solidFill>
           </p:spPr>
+          <p:txBody>
+            <a:bodyPr/>
+            <a:lstStyle/>
+            <a:p>
+              <a:endParaRPr lang="es-ES"/>
+            </a:p>
+          </p:txBody>
         </p:sp>
       </p:grpSp>
       <p:grpSp>
@@ -15012,6 +17605,13 @@
               <a:srgbClr val="FFFFFF"/>
             </a:solidFill>
           </p:spPr>
+          <p:txBody>
+            <a:bodyPr/>
+            <a:lstStyle/>
+            <a:p>
+              <a:endParaRPr lang="es-ES"/>
+            </a:p>
+          </p:txBody>
         </p:sp>
       </p:grpSp>
       <p:sp>
@@ -15123,7 +17723,7 @@
         <p:spPr>
           <a:xfrm>
             <a:off x="4138612" y="2095500"/>
-            <a:ext cx="13692188" cy="3416320"/>
+            <a:ext cx="13692188" cy="7294305"/>
           </a:xfrm>
           <a:prstGeom prst="rect">
             <a:avLst/>
@@ -15142,7 +17742,51 @@
                 <a:ea typeface="Lato Italics" panose="020B0604020202020204" charset="0"/>
                 <a:cs typeface="Lato Italics" panose="020B0604020202020204" charset="0"/>
               </a:rPr>
-              <a:t>Limpieza de los datos:</a:t>
+              <a:t>Limpieza de los datos: Datos en buen estado que no requerían de limpieza extensiva</a:t>
+            </a:r>
+          </a:p>
+          <a:p>
+            <a:endParaRPr lang="es-ES" sz="3600" dirty="0">
+              <a:latin typeface="Lato Italics" panose="020B0604020202020204" charset="0"/>
+              <a:ea typeface="Lato Italics" panose="020B0604020202020204" charset="0"/>
+              <a:cs typeface="Lato Italics" panose="020B0604020202020204" charset="0"/>
+            </a:endParaRPr>
+          </a:p>
+          <a:p>
+            <a:r>
+              <a:rPr lang="es-ES" sz="3600" dirty="0">
+                <a:latin typeface="Lato Italics" panose="020B0604020202020204" charset="0"/>
+                <a:ea typeface="Lato Italics" panose="020B0604020202020204" charset="0"/>
+                <a:cs typeface="Lato Italics" panose="020B0604020202020204" charset="0"/>
+              </a:rPr>
+              <a:t>Datos vacíos = Datos con valor 0</a:t>
+            </a:r>
+          </a:p>
+          <a:p>
+            <a:endParaRPr lang="es-ES" sz="3600" dirty="0">
+              <a:latin typeface="Lato Italics" panose="020B0604020202020204" charset="0"/>
+              <a:ea typeface="Lato Italics" panose="020B0604020202020204" charset="0"/>
+              <a:cs typeface="Lato Italics" panose="020B0604020202020204" charset="0"/>
+            </a:endParaRPr>
+          </a:p>
+          <a:p>
+            <a:r>
+              <a:rPr lang="es-ES" sz="3600" dirty="0">
+                <a:latin typeface="Lato Italics" panose="020B0604020202020204" charset="0"/>
+                <a:ea typeface="Lato Italics" panose="020B0604020202020204" charset="0"/>
+                <a:cs typeface="Lato Italics" panose="020B0604020202020204" charset="0"/>
+              </a:rPr>
+              <a:t>Tomamos todos los jugadores en lugar de aquellos con un mínimo de partidos jugados. </a:t>
+            </a:r>
+          </a:p>
+          <a:p>
+            <a:r>
+              <a:rPr lang="es-ES" sz="3600" dirty="0">
+                <a:latin typeface="Lato Italics" panose="020B0604020202020204" charset="0"/>
+                <a:ea typeface="Lato Italics" panose="020B0604020202020204" charset="0"/>
+                <a:cs typeface="Lato Italics" panose="020B0604020202020204" charset="0"/>
+              </a:rPr>
+              <a:t>Consecuencia: Filas casi vacías que no aportan a nuestro proyecto</a:t>
             </a:r>
           </a:p>
           <a:p>
@@ -15279,6 +17923,13 @@
               <a:srgbClr val="5271FF"/>
             </a:solidFill>
           </p:spPr>
+          <p:txBody>
+            <a:bodyPr/>
+            <a:lstStyle/>
+            <a:p>
+              <a:endParaRPr lang="es-ES"/>
+            </a:p>
+          </p:txBody>
         </p:sp>
       </p:grpSp>
       <p:grpSp>
@@ -15365,6 +18016,13 @@
               <a:srgbClr val="FFFFFF"/>
             </a:solidFill>
           </p:spPr>
+          <p:txBody>
+            <a:bodyPr/>
+            <a:lstStyle/>
+            <a:p>
+              <a:endParaRPr lang="es-ES"/>
+            </a:p>
+          </p:txBody>
         </p:sp>
       </p:grpSp>
       <p:grpSp>
@@ -15432,6 +18090,13 @@
               <a:srgbClr val="5271FF"/>
             </a:solidFill>
           </p:spPr>
+          <p:txBody>
+            <a:bodyPr/>
+            <a:lstStyle/>
+            <a:p>
+              <a:endParaRPr lang="es-ES"/>
+            </a:p>
+          </p:txBody>
         </p:sp>
       </p:grpSp>
       <p:grpSp>
@@ -15518,6 +18183,13 @@
               <a:srgbClr val="FFFFFF"/>
             </a:solidFill>
           </p:spPr>
+          <p:txBody>
+            <a:bodyPr/>
+            <a:lstStyle/>
+            <a:p>
+              <a:endParaRPr lang="es-ES"/>
+            </a:p>
+          </p:txBody>
         </p:sp>
       </p:grpSp>
       <p:grpSp>
@@ -15585,6 +18257,13 @@
               <a:srgbClr val="5271FF"/>
             </a:solidFill>
           </p:spPr>
+          <p:txBody>
+            <a:bodyPr/>
+            <a:lstStyle/>
+            <a:p>
+              <a:endParaRPr lang="es-ES"/>
+            </a:p>
+          </p:txBody>
         </p:sp>
       </p:grpSp>
       <p:grpSp>
@@ -15671,6 +18350,13 @@
               <a:srgbClr val="FFFFFF"/>
             </a:solidFill>
           </p:spPr>
+          <p:txBody>
+            <a:bodyPr/>
+            <a:lstStyle/>
+            <a:p>
+              <a:endParaRPr lang="es-ES"/>
+            </a:p>
+          </p:txBody>
         </p:sp>
       </p:grpSp>
       <p:sp>
@@ -15782,7 +18468,7 @@
         <p:spPr>
           <a:xfrm>
             <a:off x="4138612" y="2095500"/>
-            <a:ext cx="13692188" cy="3416320"/>
+            <a:ext cx="13692188" cy="7848302"/>
           </a:xfrm>
           <a:prstGeom prst="rect">
             <a:avLst/>
@@ -15801,7 +18487,7 @@
                 <a:ea typeface="Lato Italics" panose="020B0604020202020204" charset="0"/>
                 <a:cs typeface="Lato Italics" panose="020B0604020202020204" charset="0"/>
               </a:rPr>
-              <a:t>Integración de los datos:</a:t>
+              <a:t>Integración de los datos: Datos de dos páginas distintas</a:t>
             </a:r>
           </a:p>
           <a:p>
@@ -15810,6 +18496,76 @@
               <a:ea typeface="Lato Italics" panose="020B0604020202020204" charset="0"/>
               <a:cs typeface="Lato Italics" panose="020B0604020202020204" charset="0"/>
             </a:endParaRPr>
+          </a:p>
+          <a:p>
+            <a:r>
+              <a:rPr lang="es-ES" sz="3600" dirty="0">
+                <a:latin typeface="Lato Italics" panose="020B0604020202020204" charset="0"/>
+                <a:ea typeface="Lato Italics" panose="020B0604020202020204" charset="0"/>
+                <a:cs typeface="Lato Italics" panose="020B0604020202020204" charset="0"/>
+              </a:rPr>
+              <a:t>Las incongruencias entre las páginas web nos pasan factura: Pérdida de unos 500 datos</a:t>
+            </a:r>
+          </a:p>
+          <a:p>
+            <a:endParaRPr lang="es-ES" sz="3600" dirty="0">
+              <a:latin typeface="Lato Italics" panose="020B0604020202020204" charset="0"/>
+              <a:ea typeface="Lato Italics" panose="020B0604020202020204" charset="0"/>
+              <a:cs typeface="Lato Italics" panose="020B0604020202020204" charset="0"/>
+            </a:endParaRPr>
+          </a:p>
+          <a:p>
+            <a:r>
+              <a:rPr lang="es-ES" sz="3600" dirty="0">
+                <a:latin typeface="Lato Italics" panose="020B0604020202020204" charset="0"/>
+                <a:ea typeface="Lato Italics" panose="020B0604020202020204" charset="0"/>
+                <a:cs typeface="Lato Italics" panose="020B0604020202020204" charset="0"/>
+              </a:rPr>
+              <a:t>Herramientas: Unicode y </a:t>
+            </a:r>
+            <a:r>
+              <a:rPr lang="es-ES" sz="3600" dirty="0" err="1">
+                <a:latin typeface="Lato Italics" panose="020B0604020202020204" charset="0"/>
+                <a:ea typeface="Lato Italics" panose="020B0604020202020204" charset="0"/>
+                <a:cs typeface="Lato Italics" panose="020B0604020202020204" charset="0"/>
+              </a:rPr>
+              <a:t>Fuzzywuzzy</a:t>
+            </a:r>
+            <a:r>
+              <a:rPr lang="es-ES" sz="3600" dirty="0">
+                <a:latin typeface="Lato Italics" panose="020B0604020202020204" charset="0"/>
+                <a:ea typeface="Lato Italics" panose="020B0604020202020204" charset="0"/>
+                <a:cs typeface="Lato Italics" panose="020B0604020202020204" charset="0"/>
+              </a:rPr>
+              <a:t>. En caso de pequeñas alteraciones entre los nombres (Tildes o letras diferentes). </a:t>
+            </a:r>
+          </a:p>
+          <a:p>
+            <a:r>
+              <a:rPr lang="es-ES" sz="3600" dirty="0">
+                <a:latin typeface="Lato Italics" panose="020B0604020202020204" charset="0"/>
+                <a:ea typeface="Lato Italics" panose="020B0604020202020204" charset="0"/>
+                <a:cs typeface="Lato Italics" panose="020B0604020202020204" charset="0"/>
+              </a:rPr>
+              <a:t>80% de coincidencia en el nombre es suficiente para nosotros.</a:t>
+            </a:r>
+          </a:p>
+          <a:p>
+            <a:endParaRPr lang="es-ES" sz="3600" dirty="0">
+              <a:latin typeface="Lato Italics" panose="020B0604020202020204" charset="0"/>
+              <a:ea typeface="Lato Italics" panose="020B0604020202020204" charset="0"/>
+              <a:cs typeface="Lato Italics" panose="020B0604020202020204" charset="0"/>
+            </a:endParaRPr>
+          </a:p>
+          <a:p>
+            <a:r>
+              <a:rPr lang="es-ES" sz="3600" dirty="0">
+                <a:latin typeface="Lato Italics" panose="020B0604020202020204" charset="0"/>
+                <a:ea typeface="Lato Italics" panose="020B0604020202020204" charset="0"/>
+                <a:cs typeface="Lato Italics" panose="020B0604020202020204" charset="0"/>
+              </a:rPr>
+              <a:t>Eliminación de columnas repetidas: Minutos o partidos jugados.</a:t>
+            </a:r>
           </a:p>
           <a:p>
             <a:endParaRPr lang="es-ES" dirty="0"/>

</xml_diff>